<commit_message>
Tutorial for python and interaction with jupyter notebook
</commit_message>
<xml_diff>
--- a/00.pptx
+++ b/00.pptx
@@ -5,24 +5,19 @@
     <p:sldMasterId id="2147483660" r:id="rId1"/>
   </p:sldMasterIdLst>
   <p:notesMasterIdLst>
-    <p:notesMasterId r:id="rId14"/>
+    <p:notesMasterId r:id="rId9"/>
   </p:notesMasterIdLst>
   <p:handoutMasterIdLst>
-    <p:handoutMasterId r:id="rId15"/>
+    <p:handoutMasterId r:id="rId10"/>
   </p:handoutMasterIdLst>
   <p:sldIdLst>
     <p:sldId id="321" r:id="rId2"/>
     <p:sldId id="342" r:id="rId3"/>
-    <p:sldId id="343" r:id="rId4"/>
-    <p:sldId id="344" r:id="rId5"/>
-    <p:sldId id="345" r:id="rId6"/>
-    <p:sldId id="315" r:id="rId7"/>
-    <p:sldId id="316" r:id="rId8"/>
-    <p:sldId id="317" r:id="rId9"/>
-    <p:sldId id="318" r:id="rId10"/>
-    <p:sldId id="319" r:id="rId11"/>
-    <p:sldId id="309" r:id="rId12"/>
-    <p:sldId id="313" r:id="rId13"/>
+    <p:sldId id="347" r:id="rId4"/>
+    <p:sldId id="343" r:id="rId5"/>
+    <p:sldId id="346" r:id="rId6"/>
+    <p:sldId id="309" r:id="rId7"/>
+    <p:sldId id="313" r:id="rId8"/>
   </p:sldIdLst>
   <p:sldSz cx="9144000" cy="5715000" type="screen16x10"/>
   <p:notesSz cx="6858000" cy="9144000"/>
@@ -886,7 +881,7 @@
             <a:fld id="{05DD1DF0-DD4E-4B0C-B0FD-D16D9D2A9750}" type="slidenum">
               <a:rPr lang="en-US" smtClean="0"/>
               <a:pPr/>
-              <a:t>11</a:t>
+              <a:t>6</a:t>
             </a:fld>
             <a:endParaRPr lang="en-US"/>
           </a:p>
@@ -1044,7 +1039,7 @@
             <a:fld id="{05DD1DF0-DD4E-4B0C-B0FD-D16D9D2A9750}" type="slidenum">
               <a:rPr lang="en-US" smtClean="0"/>
               <a:pPr/>
-              <a:t>12</a:t>
+              <a:t>7</a:t>
             </a:fld>
             <a:endParaRPr lang="en-US"/>
           </a:p>
@@ -4422,814 +4417,6 @@
 </p:sld>
 </file>
 
-<file path=ppt/slides/slide10.xml><?xml version="1.0" encoding="utf-8"?>
-<p:sld xmlns:a="http://schemas.openxmlformats.org/drawingml/2006/main" xmlns:r="http://schemas.openxmlformats.org/officeDocument/2006/relationships" xmlns:p="http://schemas.openxmlformats.org/presentationml/2006/main" show="0">
-  <p:cSld>
-    <p:spTree>
-      <p:nvGrpSpPr>
-        <p:cNvPr id="1" name=""/>
-        <p:cNvGrpSpPr/>
-        <p:nvPr/>
-      </p:nvGrpSpPr>
-      <p:grpSpPr>
-        <a:xfrm>
-          <a:off x="0" y="0"/>
-          <a:ext cx="0" cy="0"/>
-          <a:chOff x="0" y="0"/>
-          <a:chExt cx="0" cy="0"/>
-        </a:xfrm>
-      </p:grpSpPr>
-      <p:sp>
-        <p:nvSpPr>
-          <p:cNvPr id="2" name="Inhaltsplatzhalter 1"/>
-          <p:cNvSpPr>
-            <a:spLocks noGrp="1"/>
-          </p:cNvSpPr>
-          <p:nvPr>
-            <p:ph idx="1"/>
-          </p:nvPr>
-        </p:nvSpPr>
-        <p:spPr/>
-        <p:txBody>
-          <a:bodyPr/>
-          <a:lstStyle/>
-          <a:p>
-            <a:endParaRPr lang="en-US" dirty="0"/>
-          </a:p>
-        </p:txBody>
-      </p:sp>
-      <p:sp>
-        <p:nvSpPr>
-          <p:cNvPr id="3" name="Textplatzhalter 2"/>
-          <p:cNvSpPr>
-            <a:spLocks noGrp="1"/>
-          </p:cNvSpPr>
-          <p:nvPr>
-            <p:ph type="body" sz="quarter" idx="13"/>
-          </p:nvPr>
-        </p:nvSpPr>
-        <p:spPr/>
-        <p:txBody>
-          <a:bodyPr/>
-          <a:lstStyle/>
-          <a:p>
-            <a:endParaRPr lang="en-US" dirty="0"/>
-          </a:p>
-        </p:txBody>
-      </p:sp>
-      <p:sp>
-        <p:nvSpPr>
-          <p:cNvPr id="4" name="Titel 3"/>
-          <p:cNvSpPr>
-            <a:spLocks noGrp="1"/>
-          </p:cNvSpPr>
-          <p:nvPr>
-            <p:ph type="title"/>
-          </p:nvPr>
-        </p:nvSpPr>
-        <p:spPr/>
-        <p:txBody>
-          <a:bodyPr/>
-          <a:lstStyle/>
-          <a:p>
-            <a:endParaRPr lang="en-US" dirty="0"/>
-          </a:p>
-        </p:txBody>
-      </p:sp>
-      <p:sp>
-        <p:nvSpPr>
-          <p:cNvPr id="5" name="Bildplatzhalter 4"/>
-          <p:cNvSpPr>
-            <a:spLocks noGrp="1"/>
-          </p:cNvSpPr>
-          <p:nvPr>
-            <p:ph type="pic" sz="quarter" idx="14"/>
-          </p:nvPr>
-        </p:nvSpPr>
-        <p:spPr/>
-      </p:sp>
-      <p:sp>
-        <p:nvSpPr>
-          <p:cNvPr id="6" name="Bildplatzhalter 5"/>
-          <p:cNvSpPr>
-            <a:spLocks noGrp="1"/>
-          </p:cNvSpPr>
-          <p:nvPr>
-            <p:ph type="pic" sz="quarter" idx="15"/>
-          </p:nvPr>
-        </p:nvSpPr>
-        <p:spPr/>
-      </p:sp>
-    </p:spTree>
-    <p:extLst>
-      <p:ext uri="{BB962C8B-B14F-4D97-AF65-F5344CB8AC3E}">
-        <p14:creationId xmlns:p14="http://schemas.microsoft.com/office/powerpoint/2010/main" val="3624793599"/>
-      </p:ext>
-    </p:extLst>
-  </p:cSld>
-  <p:clrMapOvr>
-    <a:masterClrMapping/>
-  </p:clrMapOvr>
-</p:sld>
-</file>
-
-<file path=ppt/slides/slide11.xml><?xml version="1.0" encoding="utf-8"?>
-<p:sld xmlns:a="http://schemas.openxmlformats.org/drawingml/2006/main" xmlns:r="http://schemas.openxmlformats.org/officeDocument/2006/relationships" xmlns:p="http://schemas.openxmlformats.org/presentationml/2006/main" show="0">
-  <p:cSld>
-    <p:spTree>
-      <p:nvGrpSpPr>
-        <p:cNvPr id="1" name=""/>
-        <p:cNvGrpSpPr/>
-        <p:nvPr/>
-      </p:nvGrpSpPr>
-      <p:grpSpPr>
-        <a:xfrm>
-          <a:off x="0" y="0"/>
-          <a:ext cx="0" cy="0"/>
-          <a:chOff x="0" y="0"/>
-          <a:chExt cx="0" cy="0"/>
-        </a:xfrm>
-      </p:grpSpPr>
-      <p:sp>
-        <p:nvSpPr>
-          <p:cNvPr id="11" name="Ellipse 10"/>
-          <p:cNvSpPr/>
-          <p:nvPr/>
-        </p:nvSpPr>
-        <p:spPr>
-          <a:xfrm>
-            <a:off x="5429087" y="1552819"/>
-            <a:ext cx="2152185" cy="2152185"/>
-          </a:xfrm>
-          <a:prstGeom prst="ellipse">
-            <a:avLst/>
-          </a:prstGeom>
-          <a:ln>
-            <a:noFill/>
-          </a:ln>
-        </p:spPr>
-        <p:style>
-          <a:lnRef idx="2">
-            <a:schemeClr val="accent1">
-              <a:shade val="50000"/>
-            </a:schemeClr>
-          </a:lnRef>
-          <a:fillRef idx="1">
-            <a:schemeClr val="accent1"/>
-          </a:fillRef>
-          <a:effectRef idx="0">
-            <a:schemeClr val="accent1"/>
-          </a:effectRef>
-          <a:fontRef idx="minor">
-            <a:schemeClr val="lt1"/>
-          </a:fontRef>
-        </p:style>
-        <p:txBody>
-          <a:bodyPr rtlCol="0" anchor="ctr"/>
-          <a:lstStyle/>
-          <a:p>
-            <a:pPr algn="ctr"/>
-            <a:endParaRPr lang="en-US" sz="1600" dirty="0"/>
-          </a:p>
-        </p:txBody>
-      </p:sp>
-      <p:sp>
-        <p:nvSpPr>
-          <p:cNvPr id="8" name="Rechteck 7"/>
-          <p:cNvSpPr/>
-          <p:nvPr/>
-        </p:nvSpPr>
-        <p:spPr>
-          <a:xfrm>
-            <a:off x="0" y="0"/>
-            <a:ext cx="9144000" cy="1044102"/>
-          </a:xfrm>
-          <a:prstGeom prst="rect">
-            <a:avLst/>
-          </a:prstGeom>
-          <a:solidFill>
-            <a:schemeClr val="tx1">
-              <a:lumMod val="25000"/>
-              <a:lumOff val="75000"/>
-            </a:schemeClr>
-          </a:solidFill>
-          <a:ln>
-            <a:noFill/>
-          </a:ln>
-        </p:spPr>
-        <p:style>
-          <a:lnRef idx="2">
-            <a:schemeClr val="accent1">
-              <a:shade val="50000"/>
-            </a:schemeClr>
-          </a:lnRef>
-          <a:fillRef idx="1">
-            <a:schemeClr val="accent1"/>
-          </a:fillRef>
-          <a:effectRef idx="0">
-            <a:schemeClr val="accent1"/>
-          </a:effectRef>
-          <a:fontRef idx="minor">
-            <a:schemeClr val="lt1"/>
-          </a:fontRef>
-        </p:style>
-        <p:txBody>
-          <a:bodyPr rtlCol="0" anchor="ctr"/>
-          <a:lstStyle/>
-          <a:p>
-            <a:pPr algn="ctr"/>
-            <a:endParaRPr lang="en-US" sz="1600" dirty="0"/>
-          </a:p>
-        </p:txBody>
-      </p:sp>
-      <p:sp>
-        <p:nvSpPr>
-          <p:cNvPr id="4" name="Textplatzhalter 3"/>
-          <p:cNvSpPr>
-            <a:spLocks noGrp="1"/>
-          </p:cNvSpPr>
-          <p:nvPr>
-            <p:ph type="body" sz="quarter" idx="13"/>
-          </p:nvPr>
-        </p:nvSpPr>
-        <p:spPr/>
-        <p:txBody>
-          <a:bodyPr/>
-          <a:lstStyle/>
-          <a:p>
-            <a:r>
-              <a:rPr lang="en-US" dirty="0"/>
-              <a:t>Thank you for your attention!</a:t>
-            </a:r>
-          </a:p>
-        </p:txBody>
-      </p:sp>
-      <p:sp>
-        <p:nvSpPr>
-          <p:cNvPr id="2" name="Titel 1"/>
-          <p:cNvSpPr>
-            <a:spLocks noGrp="1"/>
-          </p:cNvSpPr>
-          <p:nvPr>
-            <p:ph type="title"/>
-          </p:nvPr>
-        </p:nvSpPr>
-        <p:spPr>
-          <a:xfrm>
-            <a:off x="468000" y="202847"/>
-            <a:ext cx="8207375" cy="278290"/>
-          </a:xfrm>
-        </p:spPr>
-        <p:txBody>
-          <a:bodyPr/>
-          <a:lstStyle/>
-          <a:p>
-            <a:r>
-              <a:rPr lang="en-US" dirty="0"/>
-              <a:t>Acknowledgement</a:t>
-            </a:r>
-          </a:p>
-        </p:txBody>
-      </p:sp>
-      <p:cxnSp>
-        <p:nvCxnSpPr>
-          <p:cNvPr id="10" name="Gerader Verbinder 9"/>
-          <p:cNvCxnSpPr/>
-          <p:nvPr/>
-        </p:nvCxnSpPr>
-        <p:spPr>
-          <a:xfrm>
-            <a:off x="-6485" y="1044102"/>
-            <a:ext cx="9156970" cy="0"/>
-          </a:xfrm>
-          <a:prstGeom prst="line">
-            <a:avLst/>
-          </a:prstGeom>
-          <a:ln w="38100">
-            <a:solidFill>
-              <a:schemeClr val="tx1">
-                <a:lumMod val="75000"/>
-                <a:lumOff val="25000"/>
-              </a:schemeClr>
-            </a:solidFill>
-          </a:ln>
-        </p:spPr>
-        <p:style>
-          <a:lnRef idx="1">
-            <a:schemeClr val="accent1"/>
-          </a:lnRef>
-          <a:fillRef idx="0">
-            <a:schemeClr val="accent1"/>
-          </a:fillRef>
-          <a:effectRef idx="0">
-            <a:schemeClr val="accent1"/>
-          </a:effectRef>
-          <a:fontRef idx="minor">
-            <a:schemeClr val="tx1"/>
-          </a:fontRef>
-        </p:style>
-      </p:cxnSp>
-      <p:cxnSp>
-        <p:nvCxnSpPr>
-          <p:cNvPr id="14" name="Gerader Verbinder 13"/>
-          <p:cNvCxnSpPr/>
-          <p:nvPr/>
-        </p:nvCxnSpPr>
-        <p:spPr>
-          <a:xfrm>
-            <a:off x="-12970" y="5308059"/>
-            <a:ext cx="9156970" cy="0"/>
-          </a:xfrm>
-          <a:prstGeom prst="line">
-            <a:avLst/>
-          </a:prstGeom>
-          <a:ln w="19050">
-            <a:solidFill>
-              <a:schemeClr val="accent1"/>
-            </a:solidFill>
-          </a:ln>
-        </p:spPr>
-        <p:style>
-          <a:lnRef idx="1">
-            <a:schemeClr val="accent1"/>
-          </a:lnRef>
-          <a:fillRef idx="0">
-            <a:schemeClr val="accent1"/>
-          </a:fillRef>
-          <a:effectRef idx="0">
-            <a:schemeClr val="accent1"/>
-          </a:effectRef>
-          <a:fontRef idx="minor">
-            <a:schemeClr val="tx1"/>
-          </a:fontRef>
-        </p:style>
-      </p:cxnSp>
-      <p:sp>
-        <p:nvSpPr>
-          <p:cNvPr id="16" name="Content Placeholder 3"/>
-          <p:cNvSpPr>
-            <a:spLocks noGrp="1"/>
-          </p:cNvSpPr>
-          <p:nvPr>
-            <p:ph idx="1"/>
-          </p:nvPr>
-        </p:nvSpPr>
-        <p:spPr>
-          <a:xfrm>
-            <a:off x="5714816" y="2370419"/>
-            <a:ext cx="1580726" cy="516983"/>
-          </a:xfrm>
-        </p:spPr>
-        <p:txBody>
-          <a:bodyPr/>
-          <a:lstStyle/>
-          <a:p>
-            <a:pPr marL="0" indent="0" algn="ctr">
-              <a:spcBef>
-                <a:spcPts val="0"/>
-              </a:spcBef>
-              <a:buNone/>
-            </a:pPr>
-            <a:r>
-              <a:rPr lang="de-DE" sz="1400" b="1" dirty="0"/>
-              <a:t>The </a:t>
-            </a:r>
-            <a:r>
-              <a:rPr lang="de-DE" sz="1400" b="1" dirty="0" err="1"/>
-              <a:t>group</a:t>
-            </a:r>
-            <a:r>
-              <a:rPr lang="de-DE" sz="1400" b="1" dirty="0"/>
-              <a:t> at </a:t>
-            </a:r>
-            <a:r>
-              <a:rPr lang="de-DE" sz="1400" b="1" dirty="0" err="1"/>
-              <a:t>the</a:t>
-            </a:r>
-            <a:r>
-              <a:rPr lang="de-DE" sz="1400" b="1" dirty="0"/>
-              <a:t> IBVT Stuttgart</a:t>
-            </a:r>
-          </a:p>
-        </p:txBody>
-      </p:sp>
-      <p:grpSp>
-        <p:nvGrpSpPr>
-          <p:cNvPr id="18" name="Gruppieren 17"/>
-          <p:cNvGrpSpPr/>
-          <p:nvPr/>
-        </p:nvGrpSpPr>
-        <p:grpSpPr>
-          <a:xfrm>
-            <a:off x="3485040" y="2607576"/>
-            <a:ext cx="2448496" cy="2448496"/>
-            <a:chOff x="5305977" y="2430758"/>
-            <a:chExt cx="2448496" cy="2448496"/>
-          </a:xfrm>
-        </p:grpSpPr>
-        <p:sp>
-          <p:nvSpPr>
-            <p:cNvPr id="17" name="Ellipse 16"/>
-            <p:cNvSpPr/>
-            <p:nvPr/>
-          </p:nvSpPr>
-          <p:spPr>
-            <a:xfrm>
-              <a:off x="5305977" y="2430758"/>
-              <a:ext cx="2448496" cy="2448496"/>
-            </a:xfrm>
-            <a:prstGeom prst="ellipse">
-              <a:avLst/>
-            </a:prstGeom>
-            <a:solidFill>
-              <a:srgbClr val="CCCCCC"/>
-            </a:solidFill>
-            <a:ln>
-              <a:noFill/>
-            </a:ln>
-          </p:spPr>
-          <p:style>
-            <a:lnRef idx="2">
-              <a:schemeClr val="accent1">
-                <a:shade val="50000"/>
-              </a:schemeClr>
-            </a:lnRef>
-            <a:fillRef idx="1">
-              <a:schemeClr val="accent1"/>
-            </a:fillRef>
-            <a:effectRef idx="0">
-              <a:schemeClr val="accent1"/>
-            </a:effectRef>
-            <a:fontRef idx="minor">
-              <a:schemeClr val="lt1"/>
-            </a:fontRef>
-          </p:style>
-          <p:txBody>
-            <a:bodyPr rtlCol="0" anchor="ctr"/>
-            <a:lstStyle/>
-            <a:p>
-              <a:pPr algn="ctr"/>
-              <a:endParaRPr lang="en-US" sz="1600" dirty="0"/>
-            </a:p>
-          </p:txBody>
-        </p:sp>
-        <p:pic>
-          <p:nvPicPr>
-            <p:cNvPr id="15" name="Picture 2" descr="https://upload.wikimedia.org/wikipedia/commons/thumb/5/5c/BMBF_Logo.svg/2000px-BMBF_Logo.svg.png"/>
-            <p:cNvPicPr>
-              <a:picLocks noChangeAspect="1" noChangeArrowheads="1"/>
-            </p:cNvPicPr>
-            <p:nvPr/>
-          </p:nvPicPr>
-          <p:blipFill>
-            <a:blip r:embed="rId3" cstate="print">
-              <a:extLst>
-                <a:ext uri="{28A0092B-C50C-407E-A947-70E740481C1C}">
-                  <a14:useLocalDpi xmlns:a14="http://schemas.microsoft.com/office/drawing/2010/main" val="0"/>
-                </a:ext>
-              </a:extLst>
-            </a:blip>
-            <a:srcRect/>
-            <a:stretch>
-              <a:fillRect/>
-            </a:stretch>
-          </p:blipFill>
-          <p:spPr bwMode="auto">
-            <a:xfrm>
-              <a:off x="5383990" y="3267534"/>
-              <a:ext cx="2292471" cy="1182914"/>
-            </a:xfrm>
-            <a:prstGeom prst="rect">
-              <a:avLst/>
-            </a:prstGeom>
-            <a:noFill/>
-            <a:extLst>
-              <a:ext uri="{909E8E84-426E-40DD-AFC4-6F175D3DCCD1}">
-                <a14:hiddenFill xmlns:a14="http://schemas.microsoft.com/office/drawing/2010/main">
-                  <a:solidFill>
-                    <a:srgbClr val="FFFFFF"/>
-                  </a:solidFill>
-                </a14:hiddenFill>
-              </a:ext>
-            </a:extLst>
-          </p:spPr>
-        </p:pic>
-      </p:grpSp>
-      <p:grpSp>
-        <p:nvGrpSpPr>
-          <p:cNvPr id="19" name="Gruppieren 18"/>
-          <p:cNvGrpSpPr/>
-          <p:nvPr/>
-        </p:nvGrpSpPr>
-        <p:grpSpPr>
-          <a:xfrm>
-            <a:off x="1447789" y="1757147"/>
-            <a:ext cx="2329605" cy="2329605"/>
-            <a:chOff x="2508657" y="1362437"/>
-            <a:chExt cx="2329605" cy="2329605"/>
-          </a:xfrm>
-        </p:grpSpPr>
-        <p:sp>
-          <p:nvSpPr>
-            <p:cNvPr id="3" name="Ellipse 2"/>
-            <p:cNvSpPr/>
-            <p:nvPr/>
-          </p:nvSpPr>
-          <p:spPr>
-            <a:xfrm>
-              <a:off x="2508657" y="1362437"/>
-              <a:ext cx="2329605" cy="2329605"/>
-            </a:xfrm>
-            <a:prstGeom prst="ellipse">
-              <a:avLst/>
-            </a:prstGeom>
-            <a:solidFill>
-              <a:schemeClr val="tx1"/>
-            </a:solidFill>
-            <a:ln>
-              <a:noFill/>
-            </a:ln>
-          </p:spPr>
-          <p:style>
-            <a:lnRef idx="2">
-              <a:schemeClr val="accent1">
-                <a:shade val="50000"/>
-              </a:schemeClr>
-            </a:lnRef>
-            <a:fillRef idx="1">
-              <a:schemeClr val="accent1"/>
-            </a:fillRef>
-            <a:effectRef idx="0">
-              <a:schemeClr val="accent1"/>
-            </a:effectRef>
-            <a:fontRef idx="minor">
-              <a:schemeClr val="lt1"/>
-            </a:fontRef>
-          </p:style>
-          <p:txBody>
-            <a:bodyPr rtlCol="0" anchor="ctr"/>
-            <a:lstStyle/>
-            <a:p>
-              <a:pPr algn="ctr"/>
-              <a:endParaRPr lang="en-US" sz="1600" dirty="0"/>
-            </a:p>
-          </p:txBody>
-        </p:sp>
-        <p:sp>
-          <p:nvSpPr>
-            <p:cNvPr id="9" name="Rechteck 8"/>
-            <p:cNvSpPr/>
-            <p:nvPr/>
-          </p:nvSpPr>
-          <p:spPr>
-            <a:xfrm>
-              <a:off x="2789286" y="2006407"/>
-              <a:ext cx="1886849" cy="338554"/>
-            </a:xfrm>
-            <a:prstGeom prst="rect">
-              <a:avLst/>
-            </a:prstGeom>
-          </p:spPr>
-          <p:txBody>
-            <a:bodyPr wrap="square">
-              <a:spAutoFit/>
-            </a:bodyPr>
-            <a:lstStyle/>
-            <a:p>
-              <a:r>
-                <a:rPr lang="en-US" sz="1600" dirty="0">
-                  <a:solidFill>
-                    <a:schemeClr val="bg1"/>
-                  </a:solidFill>
-                </a:rPr>
-                <a:t>Thanks to</a:t>
-              </a:r>
-            </a:p>
-          </p:txBody>
-        </p:sp>
-      </p:grpSp>
-    </p:spTree>
-    <p:extLst>
-      <p:ext uri="{BB962C8B-B14F-4D97-AF65-F5344CB8AC3E}">
-        <p14:creationId xmlns:p14="http://schemas.microsoft.com/office/powerpoint/2010/main" val="3548696649"/>
-      </p:ext>
-    </p:extLst>
-  </p:cSld>
-  <p:clrMapOvr>
-    <a:masterClrMapping/>
-  </p:clrMapOvr>
-</p:sld>
-</file>
-
-<file path=ppt/slides/slide12.xml><?xml version="1.0" encoding="utf-8"?>
-<p:sld xmlns:a="http://schemas.openxmlformats.org/drawingml/2006/main" xmlns:r="http://schemas.openxmlformats.org/officeDocument/2006/relationships" xmlns:p="http://schemas.openxmlformats.org/presentationml/2006/main" show="0">
-  <p:cSld>
-    <p:spTree>
-      <p:nvGrpSpPr>
-        <p:cNvPr id="1" name=""/>
-        <p:cNvGrpSpPr/>
-        <p:nvPr/>
-      </p:nvGrpSpPr>
-      <p:grpSpPr>
-        <a:xfrm>
-          <a:off x="0" y="0"/>
-          <a:ext cx="0" cy="0"/>
-          <a:chOff x="0" y="0"/>
-          <a:chExt cx="0" cy="0"/>
-        </a:xfrm>
-      </p:grpSpPr>
-      <p:sp>
-        <p:nvSpPr>
-          <p:cNvPr id="8" name="Rechteck 7"/>
-          <p:cNvSpPr/>
-          <p:nvPr/>
-        </p:nvSpPr>
-        <p:spPr>
-          <a:xfrm>
-            <a:off x="0" y="0"/>
-            <a:ext cx="9144000" cy="1044102"/>
-          </a:xfrm>
-          <a:prstGeom prst="rect">
-            <a:avLst/>
-          </a:prstGeom>
-          <a:solidFill>
-            <a:schemeClr val="tx1">
-              <a:lumMod val="25000"/>
-              <a:lumOff val="75000"/>
-            </a:schemeClr>
-          </a:solidFill>
-          <a:ln>
-            <a:noFill/>
-          </a:ln>
-        </p:spPr>
-        <p:style>
-          <a:lnRef idx="2">
-            <a:schemeClr val="accent1">
-              <a:shade val="50000"/>
-            </a:schemeClr>
-          </a:lnRef>
-          <a:fillRef idx="1">
-            <a:schemeClr val="accent1"/>
-          </a:fillRef>
-          <a:effectRef idx="0">
-            <a:schemeClr val="accent1"/>
-          </a:effectRef>
-          <a:fontRef idx="minor">
-            <a:schemeClr val="lt1"/>
-          </a:fontRef>
-        </p:style>
-        <p:txBody>
-          <a:bodyPr rtlCol="0" anchor="ctr"/>
-          <a:lstStyle/>
-          <a:p>
-            <a:pPr algn="ctr"/>
-            <a:endParaRPr lang="en-US" sz="1600" dirty="0"/>
-          </a:p>
-        </p:txBody>
-      </p:sp>
-      <p:sp>
-        <p:nvSpPr>
-          <p:cNvPr id="4" name="Textplatzhalter 3"/>
-          <p:cNvSpPr>
-            <a:spLocks noGrp="1"/>
-          </p:cNvSpPr>
-          <p:nvPr>
-            <p:ph type="body" sz="quarter" idx="13"/>
-          </p:nvPr>
-        </p:nvSpPr>
-        <p:spPr/>
-        <p:txBody>
-          <a:bodyPr/>
-          <a:lstStyle/>
-          <a:p>
-            <a:r>
-              <a:rPr lang="en-US" dirty="0"/>
-              <a:t>BSD</a:t>
-            </a:r>
-          </a:p>
-        </p:txBody>
-      </p:sp>
-      <p:sp>
-        <p:nvSpPr>
-          <p:cNvPr id="2" name="Titel 1"/>
-          <p:cNvSpPr>
-            <a:spLocks noGrp="1"/>
-          </p:cNvSpPr>
-          <p:nvPr>
-            <p:ph type="title"/>
-          </p:nvPr>
-        </p:nvSpPr>
-        <p:spPr>
-          <a:xfrm>
-            <a:off x="468000" y="202847"/>
-            <a:ext cx="8207375" cy="278290"/>
-          </a:xfrm>
-        </p:spPr>
-        <p:txBody>
-          <a:bodyPr/>
-          <a:lstStyle/>
-          <a:p>
-            <a:r>
-              <a:rPr lang="en-US" dirty="0"/>
-              <a:t>Back-up</a:t>
-            </a:r>
-            <a:r>
-              <a:rPr lang="de-DE" dirty="0"/>
-              <a:t> </a:t>
-            </a:r>
-            <a:r>
-              <a:rPr lang="en-US" dirty="0"/>
-              <a:t>slides</a:t>
-            </a:r>
-          </a:p>
-        </p:txBody>
-      </p:sp>
-      <p:cxnSp>
-        <p:nvCxnSpPr>
-          <p:cNvPr id="10" name="Gerader Verbinder 9"/>
-          <p:cNvCxnSpPr/>
-          <p:nvPr/>
-        </p:nvCxnSpPr>
-        <p:spPr>
-          <a:xfrm>
-            <a:off x="-6485" y="1044102"/>
-            <a:ext cx="9156970" cy="0"/>
-          </a:xfrm>
-          <a:prstGeom prst="line">
-            <a:avLst/>
-          </a:prstGeom>
-          <a:ln w="38100">
-            <a:solidFill>
-              <a:schemeClr val="tx1">
-                <a:lumMod val="75000"/>
-                <a:lumOff val="25000"/>
-              </a:schemeClr>
-            </a:solidFill>
-          </a:ln>
-        </p:spPr>
-        <p:style>
-          <a:lnRef idx="1">
-            <a:schemeClr val="accent1"/>
-          </a:lnRef>
-          <a:fillRef idx="0">
-            <a:schemeClr val="accent1"/>
-          </a:fillRef>
-          <a:effectRef idx="0">
-            <a:schemeClr val="accent1"/>
-          </a:effectRef>
-          <a:fontRef idx="minor">
-            <a:schemeClr val="tx1"/>
-          </a:fontRef>
-        </p:style>
-      </p:cxnSp>
-      <p:cxnSp>
-        <p:nvCxnSpPr>
-          <p:cNvPr id="14" name="Gerader Verbinder 13"/>
-          <p:cNvCxnSpPr/>
-          <p:nvPr/>
-        </p:nvCxnSpPr>
-        <p:spPr>
-          <a:xfrm>
-            <a:off x="-12970" y="5308059"/>
-            <a:ext cx="9156970" cy="0"/>
-          </a:xfrm>
-          <a:prstGeom prst="line">
-            <a:avLst/>
-          </a:prstGeom>
-          <a:ln w="19050">
-            <a:solidFill>
-              <a:schemeClr val="accent1"/>
-            </a:solidFill>
-          </a:ln>
-        </p:spPr>
-        <p:style>
-          <a:lnRef idx="1">
-            <a:schemeClr val="accent1"/>
-          </a:lnRef>
-          <a:fillRef idx="0">
-            <a:schemeClr val="accent1"/>
-          </a:fillRef>
-          <a:effectRef idx="0">
-            <a:schemeClr val="accent1"/>
-          </a:effectRef>
-          <a:fontRef idx="minor">
-            <a:schemeClr val="tx1"/>
-          </a:fontRef>
-        </p:style>
-      </p:cxnSp>
-    </p:spTree>
-    <p:extLst>
-      <p:ext uri="{BB962C8B-B14F-4D97-AF65-F5344CB8AC3E}">
-        <p14:creationId xmlns:p14="http://schemas.microsoft.com/office/powerpoint/2010/main" val="2440802619"/>
-      </p:ext>
-    </p:extLst>
-  </p:cSld>
-  <p:clrMapOvr>
-    <a:masterClrMapping/>
-  </p:clrMapOvr>
-</p:sld>
-</file>
-
 <file path=ppt/slides/slide2.xml><?xml version="1.0" encoding="utf-8"?>
 <p:sld xmlns:a="http://schemas.openxmlformats.org/drawingml/2006/main" xmlns:r="http://schemas.openxmlformats.org/officeDocument/2006/relationships" xmlns:p="http://schemas.openxmlformats.org/presentationml/2006/main" show="0">
   <p:cSld>
@@ -5420,6 +4607,132 @@
 </file>
 
 <file path=ppt/slides/slide3.xml><?xml version="1.0" encoding="utf-8"?>
+<p:sld xmlns:a="http://schemas.openxmlformats.org/drawingml/2006/main" xmlns:r="http://schemas.openxmlformats.org/officeDocument/2006/relationships" xmlns:p="http://schemas.openxmlformats.org/presentationml/2006/main">
+  <p:cSld>
+    <p:spTree>
+      <p:nvGrpSpPr>
+        <p:cNvPr id="1" name=""/>
+        <p:cNvGrpSpPr/>
+        <p:nvPr/>
+      </p:nvGrpSpPr>
+      <p:grpSpPr>
+        <a:xfrm>
+          <a:off x="0" y="0"/>
+          <a:ext cx="0" cy="0"/>
+          <a:chOff x="0" y="0"/>
+          <a:chExt cx="0" cy="0"/>
+        </a:xfrm>
+      </p:grpSpPr>
+      <p:sp>
+        <p:nvSpPr>
+          <p:cNvPr id="9" name="Content Placeholder 1">
+            <a:extLst>
+              <a:ext uri="{FF2B5EF4-FFF2-40B4-BE49-F238E27FC236}">
+                <a16:creationId xmlns:a16="http://schemas.microsoft.com/office/drawing/2014/main" id="{24404FE6-EACB-42FE-858D-E3640CD396AB}"/>
+              </a:ext>
+            </a:extLst>
+          </p:cNvPr>
+          <p:cNvSpPr>
+            <a:spLocks noGrp="1"/>
+          </p:cNvSpPr>
+          <p:nvPr>
+            <p:ph idx="1"/>
+          </p:nvPr>
+        </p:nvSpPr>
+        <p:spPr>
+          <a:xfrm>
+            <a:off x="468313" y="1234646"/>
+            <a:ext cx="7635644" cy="3854879"/>
+          </a:xfrm>
+        </p:spPr>
+        <p:txBody>
+          <a:bodyPr/>
+          <a:lstStyle/>
+          <a:p>
+            <a:pPr marL="0" indent="0">
+              <a:buNone/>
+            </a:pPr>
+            <a:endParaRPr lang="en-US" sz="2000" dirty="0"/>
+          </a:p>
+        </p:txBody>
+      </p:sp>
+      <p:sp>
+        <p:nvSpPr>
+          <p:cNvPr id="11" name="Text Placeholder 2">
+            <a:extLst>
+              <a:ext uri="{FF2B5EF4-FFF2-40B4-BE49-F238E27FC236}">
+                <a16:creationId xmlns:a16="http://schemas.microsoft.com/office/drawing/2014/main" id="{020916A4-1060-4718-A2E3-9DB1ECF44264}"/>
+              </a:ext>
+            </a:extLst>
+          </p:cNvPr>
+          <p:cNvSpPr>
+            <a:spLocks noGrp="1"/>
+          </p:cNvSpPr>
+          <p:nvPr>
+            <p:ph type="body" sz="quarter" idx="13"/>
+          </p:nvPr>
+        </p:nvSpPr>
+        <p:spPr>
+          <a:xfrm>
+            <a:off x="467375" y="481137"/>
+            <a:ext cx="8208000" cy="276225"/>
+          </a:xfrm>
+        </p:spPr>
+        <p:txBody>
+          <a:bodyPr/>
+          <a:lstStyle/>
+          <a:p>
+            <a:endParaRPr lang="en-US"/>
+          </a:p>
+        </p:txBody>
+      </p:sp>
+      <p:sp>
+        <p:nvSpPr>
+          <p:cNvPr id="13" name="Title 3">
+            <a:extLst>
+              <a:ext uri="{FF2B5EF4-FFF2-40B4-BE49-F238E27FC236}">
+                <a16:creationId xmlns:a16="http://schemas.microsoft.com/office/drawing/2014/main" id="{6448696F-B455-497D-8CB1-A9D8AAB54AF1}"/>
+              </a:ext>
+            </a:extLst>
+          </p:cNvPr>
+          <p:cNvSpPr>
+            <a:spLocks noGrp="1"/>
+          </p:cNvSpPr>
+          <p:nvPr>
+            <p:ph type="title"/>
+          </p:nvPr>
+        </p:nvSpPr>
+        <p:spPr>
+          <a:xfrm>
+            <a:off x="468000" y="202847"/>
+            <a:ext cx="8207375" cy="278290"/>
+          </a:xfrm>
+        </p:spPr>
+        <p:txBody>
+          <a:bodyPr/>
+          <a:lstStyle/>
+          <a:p>
+            <a:r>
+              <a:rPr lang="en-US" dirty="0"/>
+              <a:t>Little programs</a:t>
+            </a:r>
+          </a:p>
+        </p:txBody>
+      </p:sp>
+    </p:spTree>
+    <p:extLst>
+      <p:ext uri="{BB962C8B-B14F-4D97-AF65-F5344CB8AC3E}">
+        <p14:creationId xmlns:p14="http://schemas.microsoft.com/office/powerpoint/2010/main" val="4076404977"/>
+      </p:ext>
+    </p:extLst>
+  </p:cSld>
+  <p:clrMapOvr>
+    <a:masterClrMapping/>
+  </p:clrMapOvr>
+</p:sld>
+</file>
+
+<file path=ppt/slides/slide4.xml><?xml version="1.0" encoding="utf-8"?>
 <p:sld xmlns:a="http://schemas.openxmlformats.org/drawingml/2006/main" xmlns:r="http://schemas.openxmlformats.org/officeDocument/2006/relationships" xmlns:p="http://schemas.openxmlformats.org/presentationml/2006/main" show="0">
   <p:cSld>
     <p:spTree>
@@ -5647,7 +4960,7 @@
           <a:p>
             <a:r>
               <a:rPr lang="en-US" dirty="0"/>
-              <a:t>Task 1</a:t>
+              <a:t>Task 1. Celsius -&gt; Kelvin</a:t>
             </a:r>
           </a:p>
         </p:txBody>
@@ -5684,163 +4997,6 @@
     <p:extLst>
       <p:ext uri="{BB962C8B-B14F-4D97-AF65-F5344CB8AC3E}">
         <p14:creationId xmlns:p14="http://schemas.microsoft.com/office/powerpoint/2010/main" val="2342179974"/>
-      </p:ext>
-    </p:extLst>
-  </p:cSld>
-  <p:clrMapOvr>
-    <a:masterClrMapping/>
-  </p:clrMapOvr>
-</p:sld>
-</file>
-
-<file path=ppt/slides/slide4.xml><?xml version="1.0" encoding="utf-8"?>
-<p:sld xmlns:a="http://schemas.openxmlformats.org/drawingml/2006/main" xmlns:r="http://schemas.openxmlformats.org/officeDocument/2006/relationships" xmlns:p="http://schemas.openxmlformats.org/presentationml/2006/main" show="0">
-  <p:cSld>
-    <p:spTree>
-      <p:nvGrpSpPr>
-        <p:cNvPr id="1" name=""/>
-        <p:cNvGrpSpPr/>
-        <p:nvPr/>
-      </p:nvGrpSpPr>
-      <p:grpSpPr>
-        <a:xfrm>
-          <a:off x="0" y="0"/>
-          <a:ext cx="0" cy="0"/>
-          <a:chOff x="0" y="0"/>
-          <a:chExt cx="0" cy="0"/>
-        </a:xfrm>
-      </p:grpSpPr>
-      <p:sp>
-        <p:nvSpPr>
-          <p:cNvPr id="2" name="Inhaltsplatzhalter 1"/>
-          <p:cNvSpPr>
-            <a:spLocks noGrp="1"/>
-          </p:cNvSpPr>
-          <p:nvPr>
-            <p:ph idx="1"/>
-          </p:nvPr>
-        </p:nvSpPr>
-        <p:spPr/>
-        <p:txBody>
-          <a:bodyPr/>
-          <a:lstStyle/>
-          <a:p>
-            <a:r>
-              <a:rPr lang="en-US" dirty="0">
-                <a:latin typeface="Courier New" panose="02070309020205020404" pitchFamily="49" charset="0"/>
-                <a:cs typeface="Courier New" panose="02070309020205020404" pitchFamily="49" charset="0"/>
-              </a:rPr>
-              <a:t>python3</a:t>
-            </a:r>
-            <a:r>
-              <a:rPr lang="en-US" dirty="0"/>
-              <a:t> - programming language</a:t>
-            </a:r>
-          </a:p>
-          <a:p>
-            <a:r>
-              <a:rPr lang="en-US" dirty="0">
-                <a:latin typeface="Courier New" panose="02070309020205020404" pitchFamily="49" charset="0"/>
-                <a:cs typeface="Courier New" panose="02070309020205020404" pitchFamily="49" charset="0"/>
-              </a:rPr>
-              <a:t>pip3</a:t>
-            </a:r>
-            <a:r>
-              <a:rPr lang="en-US" dirty="0"/>
-              <a:t> – package installer with python3 </a:t>
-            </a:r>
-          </a:p>
-          <a:p>
-            <a:r>
-              <a:rPr lang="en-US" dirty="0" err="1">
-                <a:latin typeface="Courier New" panose="02070309020205020404" pitchFamily="49" charset="0"/>
-                <a:cs typeface="Courier New" panose="02070309020205020404" pitchFamily="49" charset="0"/>
-              </a:rPr>
-              <a:t>Jupyter</a:t>
-            </a:r>
-            <a:r>
-              <a:rPr lang="en-US" dirty="0">
-                <a:latin typeface="Courier New" panose="02070309020205020404" pitchFamily="49" charset="0"/>
-                <a:cs typeface="Courier New" panose="02070309020205020404" pitchFamily="49" charset="0"/>
-              </a:rPr>
-              <a:t> Notebook </a:t>
-            </a:r>
-            <a:r>
-              <a:rPr lang="en-US" dirty="0"/>
-              <a:t>– interactive journal</a:t>
-            </a:r>
-          </a:p>
-          <a:p>
-            <a:pPr marL="0" indent="0" algn="ctr">
-              <a:buNone/>
-            </a:pPr>
-            <a:endParaRPr lang="en-US" dirty="0"/>
-          </a:p>
-          <a:p>
-            <a:pPr marL="0" indent="0" algn="ctr">
-              <a:buNone/>
-            </a:pPr>
-            <a:r>
-              <a:rPr lang="en-US" sz="3600" dirty="0">
-                <a:solidFill>
-                  <a:schemeClr val="accent1"/>
-                </a:solidFill>
-              </a:rPr>
-              <a:t>LIVE DEMO</a:t>
-            </a:r>
-          </a:p>
-        </p:txBody>
-      </p:sp>
-      <p:sp>
-        <p:nvSpPr>
-          <p:cNvPr id="5" name="Textplatzhalter 4"/>
-          <p:cNvSpPr>
-            <a:spLocks noGrp="1"/>
-          </p:cNvSpPr>
-          <p:nvPr>
-            <p:ph type="body" sz="quarter" idx="13"/>
-          </p:nvPr>
-        </p:nvSpPr>
-        <p:spPr/>
-        <p:txBody>
-          <a:bodyPr/>
-          <a:lstStyle/>
-          <a:p>
-            <a:endParaRPr lang="en-US" dirty="0"/>
-          </a:p>
-        </p:txBody>
-      </p:sp>
-      <p:sp>
-        <p:nvSpPr>
-          <p:cNvPr id="6" name="Titel 5"/>
-          <p:cNvSpPr>
-            <a:spLocks noGrp="1"/>
-          </p:cNvSpPr>
-          <p:nvPr>
-            <p:ph type="title"/>
-          </p:nvPr>
-        </p:nvSpPr>
-        <p:spPr>
-          <a:xfrm>
-            <a:off x="468000" y="202847"/>
-            <a:ext cx="8207375" cy="278290"/>
-          </a:xfrm>
-        </p:spPr>
-        <p:txBody>
-          <a:bodyPr/>
-          <a:lstStyle/>
-          <a:p>
-            <a:r>
-              <a:rPr lang="en-US" dirty="0"/>
-              <a:t>Tools</a:t>
-            </a:r>
-          </a:p>
-        </p:txBody>
-      </p:sp>
-    </p:spTree>
-    <p:extLst>
-      <p:ext uri="{BB962C8B-B14F-4D97-AF65-F5344CB8AC3E}">
-        <p14:creationId xmlns:p14="http://schemas.microsoft.com/office/powerpoint/2010/main" val="225684246"/>
       </p:ext>
     </p:extLst>
   </p:cSld>
@@ -5867,109 +5023,187 @@
           <a:chExt cx="0" cy="0"/>
         </a:xfrm>
       </p:grpSpPr>
-      <p:sp>
-        <p:nvSpPr>
-          <p:cNvPr id="2" name="Inhaltsplatzhalter 1"/>
-          <p:cNvSpPr>
-            <a:spLocks noGrp="1"/>
-          </p:cNvSpPr>
-          <p:nvPr>
-            <p:ph idx="1"/>
-          </p:nvPr>
-        </p:nvSpPr>
-        <p:spPr/>
-        <p:txBody>
-          <a:bodyPr/>
-          <a:lstStyle/>
-          <a:p>
-            <a:r>
-              <a:rPr lang="en-US" sz="1600" dirty="0">
-                <a:cs typeface="Calibri" panose="020F0502020204030204" pitchFamily="34" charset="0"/>
-              </a:rPr>
-              <a:t>Main data extraction and processing libraries are:</a:t>
-            </a:r>
-            <a:endParaRPr lang="en-US" sz="1600" b="1" dirty="0">
-              <a:cs typeface="Calibri" panose="020F0502020204030204" pitchFamily="34" charset="0"/>
-            </a:endParaRPr>
-          </a:p>
-          <a:p>
-            <a:pPr lvl="1"/>
-            <a:r>
-              <a:rPr lang="en-US" sz="1400" b="1" dirty="0">
-                <a:solidFill>
-                  <a:srgbClr val="0000FF"/>
-                </a:solidFill>
-                <a:latin typeface="Courier New" panose="02070309020205020404" pitchFamily="49" charset="0"/>
-                <a:cs typeface="Courier New" panose="02070309020205020404" pitchFamily="49" charset="0"/>
-              </a:rPr>
-              <a:t>matplotlib – </a:t>
-            </a:r>
-            <a:r>
-              <a:rPr lang="en-US" sz="1400" dirty="0">
-                <a:cs typeface="Calibri" panose="020F0502020204030204" pitchFamily="34" charset="0"/>
-              </a:rPr>
-              <a:t>plot certain dataset or function</a:t>
-            </a:r>
-            <a:endParaRPr lang="en-US" sz="1400" b="1" dirty="0">
-              <a:solidFill>
-                <a:srgbClr val="0000FF"/>
-              </a:solidFill>
-              <a:cs typeface="Calibri" panose="020F0502020204030204" pitchFamily="34" charset="0"/>
-            </a:endParaRPr>
-          </a:p>
-          <a:p>
-            <a:pPr lvl="1"/>
-            <a:r>
-              <a:rPr lang="en-US" sz="1400" b="1" dirty="0" err="1">
-                <a:solidFill>
-                  <a:srgbClr val="0000FF"/>
-                </a:solidFill>
-                <a:latin typeface="Courier New" panose="02070309020205020404" pitchFamily="49" charset="0"/>
-                <a:cs typeface="Courier New" panose="02070309020205020404" pitchFamily="49" charset="0"/>
-              </a:rPr>
-              <a:t>numpy</a:t>
-            </a:r>
-            <a:r>
-              <a:rPr lang="en-US" sz="1400" b="1" dirty="0">
-                <a:solidFill>
-                  <a:srgbClr val="0000FF"/>
-                </a:solidFill>
-                <a:latin typeface="Courier New" panose="02070309020205020404" pitchFamily="49" charset="0"/>
-                <a:cs typeface="Courier New" panose="02070309020205020404" pitchFamily="49" charset="0"/>
-              </a:rPr>
-              <a:t> - </a:t>
-            </a:r>
-            <a:r>
-              <a:rPr lang="en-US" sz="1400" dirty="0">
-                <a:cs typeface="Calibri" panose="020F0502020204030204" pitchFamily="34" charset="0"/>
-              </a:rPr>
-              <a:t>plot certain dataset or function</a:t>
-            </a:r>
-          </a:p>
-          <a:p>
-            <a:pPr lvl="1"/>
-            <a:r>
-              <a:rPr lang="en-US" sz="1400" b="1" dirty="0">
-                <a:solidFill>
-                  <a:srgbClr val="0000FF"/>
-                </a:solidFill>
-                <a:latin typeface="Courier New" panose="02070309020205020404" pitchFamily="49" charset="0"/>
-                <a:cs typeface="Courier New" panose="02070309020205020404" pitchFamily="49" charset="0"/>
-              </a:rPr>
-              <a:t>pandas – </a:t>
-            </a:r>
-            <a:r>
-              <a:rPr lang="en-US" sz="1400" dirty="0">
-                <a:cs typeface="Calibri" panose="020F0502020204030204" pitchFamily="34" charset="0"/>
-              </a:rPr>
-              <a:t>data analysis tools</a:t>
-            </a:r>
-          </a:p>
-        </p:txBody>
-      </p:sp>
-      <p:sp>
-        <p:nvSpPr>
-          <p:cNvPr id="5" name="Textplatzhalter 4"/>
+      <mc:AlternateContent xmlns:mc="http://schemas.openxmlformats.org/markup-compatibility/2006">
+        <mc:Choice xmlns:a14="http://schemas.microsoft.com/office/drawing/2010/main" Requires="a14">
+          <p:sp>
+            <p:nvSpPr>
+              <p:cNvPr id="11" name="Content Placeholder 1">
+                <a:extLst>
+                  <a:ext uri="{FF2B5EF4-FFF2-40B4-BE49-F238E27FC236}">
+                    <a16:creationId xmlns:a16="http://schemas.microsoft.com/office/drawing/2014/main" id="{1D5A6809-A231-4646-9146-DACC2E9CA2AA}"/>
+                  </a:ext>
+                </a:extLst>
+              </p:cNvPr>
+              <p:cNvSpPr>
+                <a:spLocks noGrp="1"/>
+              </p:cNvSpPr>
+              <p:nvPr>
+                <p:ph idx="1"/>
+              </p:nvPr>
+            </p:nvSpPr>
+            <p:spPr>
+              <a:xfrm>
+                <a:off x="468313" y="1234646"/>
+                <a:ext cx="3796882" cy="3854879"/>
+              </a:xfrm>
+            </p:spPr>
+            <p:txBody>
+              <a:bodyPr/>
+              <a:lstStyle/>
+              <a:p>
+                <a:pPr marL="342900" indent="-342900">
+                  <a:buFont typeface="+mj-lt"/>
+                  <a:buAutoNum type="arabicPeriod"/>
+                </a:pPr>
+                <a:r>
+                  <a:rPr lang="en-US" dirty="0"/>
+                  <a:t>Input name and age.</a:t>
+                </a:r>
+              </a:p>
+              <a:p>
+                <a:pPr marL="342900" indent="-342900">
+                  <a:buFont typeface="+mj-lt"/>
+                  <a:buAutoNum type="arabicPeriod"/>
+                </a:pPr>
+                <a:r>
+                  <a:rPr lang="en-US" dirty="0"/>
+                  <a:t>if:</a:t>
+                </a:r>
+              </a:p>
+              <a:p>
+                <a:pPr marL="531813" lvl="1" indent="-342900">
+                  <a:buFont typeface="+mj-lt"/>
+                  <a:buAutoNum type="arabicPeriod"/>
+                </a:pPr>
+                <a:r>
+                  <a:rPr lang="en-US" dirty="0"/>
+                  <a:t>age&gt;19 =&gt; </a:t>
+                </a:r>
+                <a14:m>
+                  <m:oMath xmlns:m="http://schemas.openxmlformats.org/officeDocument/2006/math">
+                    <m:r>
+                      <a:rPr lang="en-US" b="0" i="1" smtClean="0">
+                        <a:latin typeface="Cambria Math" panose="02040503050406030204" pitchFamily="18" charset="0"/>
+                      </a:rPr>
+                      <m:t>“</m:t>
+                    </m:r>
+                    <m:r>
+                      <a:rPr lang="en-US" b="0" i="1" smtClean="0">
+                        <a:latin typeface="Cambria Math" panose="02040503050406030204" pitchFamily="18" charset="0"/>
+                      </a:rPr>
+                      <m:t>𝐺𝑜𝑜𝑑</m:t>
+                    </m:r>
+                    <m:r>
+                      <a:rPr lang="en-US" b="0" i="1" smtClean="0">
+                        <a:latin typeface="Cambria Math" panose="02040503050406030204" pitchFamily="18" charset="0"/>
+                      </a:rPr>
+                      <m:t> </m:t>
+                    </m:r>
+                    <m:r>
+                      <a:rPr lang="en-US" b="0" i="1" smtClean="0">
+                        <a:latin typeface="Cambria Math" panose="02040503050406030204" pitchFamily="18" charset="0"/>
+                      </a:rPr>
+                      <m:t>𝑛𝑒𝑤𝑠</m:t>
+                    </m:r>
+                    <m:r>
+                      <a:rPr lang="en-US" b="0" i="1" smtClean="0">
+                        <a:latin typeface="Cambria Math" panose="02040503050406030204" pitchFamily="18" charset="0"/>
+                      </a:rPr>
+                      <m:t>”</m:t>
+                    </m:r>
+                  </m:oMath>
+                </a14:m>
+                <a:endParaRPr lang="en-US" b="0" dirty="0"/>
+              </a:p>
+              <a:p>
+                <a:pPr marL="531813" lvl="1" indent="-342900">
+                  <a:buFont typeface="+mj-lt"/>
+                  <a:buAutoNum type="arabicPeriod"/>
+                </a:pPr>
+                <a:r>
+                  <a:rPr lang="en-US" dirty="0"/>
+                  <a:t>age&lt;19 =&gt; </a:t>
+                </a:r>
+                <a14:m>
+                  <m:oMath xmlns:m="http://schemas.openxmlformats.org/officeDocument/2006/math">
+                    <m:r>
+                      <a:rPr lang="en-US" i="1">
+                        <a:latin typeface="Cambria Math" panose="02040503050406030204" pitchFamily="18" charset="0"/>
+                      </a:rPr>
+                      <m:t>“</m:t>
+                    </m:r>
+                    <m:r>
+                      <a:rPr lang="en-US" b="0" i="1" smtClean="0">
+                        <a:latin typeface="Cambria Math" panose="02040503050406030204" pitchFamily="18" charset="0"/>
+                      </a:rPr>
+                      <m:t>𝑆𝑜𝑟𝑟𝑦</m:t>
+                    </m:r>
+                    <m:r>
+                      <a:rPr lang="en-US" b="0" i="1" smtClean="0">
+                        <a:latin typeface="Cambria Math" panose="02040503050406030204" pitchFamily="18" charset="0"/>
+                      </a:rPr>
+                      <m:t>”</m:t>
+                    </m:r>
+                  </m:oMath>
+                </a14:m>
+                <a:endParaRPr lang="en-US" dirty="0"/>
+              </a:p>
+            </p:txBody>
+          </p:sp>
+        </mc:Choice>
+        <mc:Fallback>
+          <p:sp>
+            <p:nvSpPr>
+              <p:cNvPr id="11" name="Content Placeholder 1">
+                <a:extLst>
+                  <a:ext uri="{FF2B5EF4-FFF2-40B4-BE49-F238E27FC236}">
+                    <a16:creationId xmlns:a16="http://schemas.microsoft.com/office/drawing/2014/main" id="{1D5A6809-A231-4646-9146-DACC2E9CA2AA}"/>
+                  </a:ext>
+                </a:extLst>
+              </p:cNvPr>
+              <p:cNvSpPr>
+                <a:spLocks noGrp="1" noRot="1" noChangeAspect="1" noMove="1" noResize="1" noEditPoints="1" noAdjustHandles="1" noChangeArrowheads="1" noChangeShapeType="1" noTextEdit="1"/>
+              </p:cNvSpPr>
+              <p:nvPr>
+                <p:ph idx="1"/>
+              </p:nvPr>
+            </p:nvSpPr>
+            <p:spPr>
+              <a:xfrm>
+                <a:off x="468313" y="1234646"/>
+                <a:ext cx="3796882" cy="3854879"/>
+              </a:xfrm>
+              <a:blipFill>
+                <a:blip r:embed="rId2"/>
+                <a:stretch>
+                  <a:fillRect l="-3667" t="-1316"/>
+                </a:stretch>
+              </a:blipFill>
+            </p:spPr>
+            <p:txBody>
+              <a:bodyPr/>
+              <a:lstStyle/>
+              <a:p>
+                <a:r>
+                  <a:rPr lang="en-US">
+                    <a:noFill/>
+                  </a:rPr>
+                  <a:t> </a:t>
+                </a:r>
+              </a:p>
+            </p:txBody>
+          </p:sp>
+        </mc:Fallback>
+      </mc:AlternateContent>
+      <p:sp>
+        <p:nvSpPr>
+          <p:cNvPr id="13" name="Text Placeholder 2">
+            <a:extLst>
+              <a:ext uri="{FF2B5EF4-FFF2-40B4-BE49-F238E27FC236}">
+                <a16:creationId xmlns:a16="http://schemas.microsoft.com/office/drawing/2014/main" id="{44C80419-7330-4F82-B00E-6A152EFF4ACC}"/>
+              </a:ext>
+            </a:extLst>
+          </p:cNvPr>
           <p:cNvSpPr>
             <a:spLocks noGrp="1"/>
           </p:cNvSpPr>
@@ -5977,12 +5211,17 @@
             <p:ph type="body" sz="quarter" idx="13"/>
           </p:nvPr>
         </p:nvSpPr>
-        <p:spPr/>
+        <p:spPr>
+          <a:xfrm>
+            <a:off x="467375" y="481137"/>
+            <a:ext cx="8208000" cy="276225"/>
+          </a:xfrm>
+        </p:spPr>
         <p:txBody>
           <a:bodyPr/>
           <a:lstStyle/>
           <a:p>
-            <a:endParaRPr lang="en-US" dirty="0"/>
+            <a:endParaRPr lang="en-US"/>
           </a:p>
         </p:txBody>
       </p:sp>
@@ -6003,20 +5242,767 @@
           </a:xfrm>
         </p:spPr>
         <p:txBody>
-          <a:bodyPr/>
+          <a:bodyPr anchor="b">
+            <a:normAutofit/>
+          </a:bodyPr>
           <a:lstStyle/>
           <a:p>
             <a:r>
               <a:rPr lang="en-US" dirty="0"/>
-              <a:t>Data extraction library </a:t>
-            </a:r>
+              <a:t>Task 2. Driver license</a:t>
+            </a:r>
+          </a:p>
+        </p:txBody>
+      </p:sp>
+      <p:sp>
+        <p:nvSpPr>
+          <p:cNvPr id="5" name="Rounded Rectangle 4">
+            <a:extLst>
+              <a:ext uri="{FF2B5EF4-FFF2-40B4-BE49-F238E27FC236}">
+                <a16:creationId xmlns:a16="http://schemas.microsoft.com/office/drawing/2014/main" id="{A5466CBC-3861-0F47-AFC8-726D3371F2F9}"/>
+              </a:ext>
+            </a:extLst>
+          </p:cNvPr>
+          <p:cNvSpPr/>
+          <p:nvPr/>
+        </p:nvSpPr>
+        <p:spPr>
+          <a:xfrm>
+            <a:off x="6400800" y="1373532"/>
+            <a:ext cx="850455" cy="276225"/>
+          </a:xfrm>
+          <a:prstGeom prst="roundRect">
+            <a:avLst>
+              <a:gd name="adj" fmla="val 20588"/>
+            </a:avLst>
+          </a:prstGeom>
+          <a:ln/>
+        </p:spPr>
+        <p:style>
+          <a:lnRef idx="2">
+            <a:schemeClr val="accent2"/>
+          </a:lnRef>
+          <a:fillRef idx="1">
+            <a:schemeClr val="lt1"/>
+          </a:fillRef>
+          <a:effectRef idx="0">
+            <a:schemeClr val="accent2"/>
+          </a:effectRef>
+          <a:fontRef idx="minor">
+            <a:schemeClr val="dk1"/>
+          </a:fontRef>
+        </p:style>
+        <p:txBody>
+          <a:bodyPr rtlCol="0" anchor="ctr"/>
+          <a:lstStyle/>
+          <a:p>
+            <a:pPr algn="ctr"/>
+            <a:r>
+              <a:rPr lang="en-US" sz="1400" dirty="0">
+                <a:latin typeface="Courier New" panose="02070309020205020404" pitchFamily="49" charset="0"/>
+                <a:cs typeface="Courier New" panose="02070309020205020404" pitchFamily="49" charset="0"/>
+              </a:rPr>
+              <a:t>start</a:t>
+            </a:r>
+            <a:endParaRPr lang="en-US" sz="1600" dirty="0">
+              <a:latin typeface="Courier New" panose="02070309020205020404" pitchFamily="49" charset="0"/>
+              <a:cs typeface="Courier New" panose="02070309020205020404" pitchFamily="49" charset="0"/>
+            </a:endParaRPr>
+          </a:p>
+        </p:txBody>
+      </p:sp>
+      <p:sp>
+        <p:nvSpPr>
+          <p:cNvPr id="9" name="Rounded Rectangle 8">
+            <a:extLst>
+              <a:ext uri="{FF2B5EF4-FFF2-40B4-BE49-F238E27FC236}">
+                <a16:creationId xmlns:a16="http://schemas.microsoft.com/office/drawing/2014/main" id="{74ABD8D9-2E8E-D845-9FDE-46E4D0E05365}"/>
+              </a:ext>
+            </a:extLst>
+          </p:cNvPr>
+          <p:cNvSpPr/>
+          <p:nvPr/>
+        </p:nvSpPr>
+        <p:spPr>
+          <a:xfrm>
+            <a:off x="6216958" y="1989411"/>
+            <a:ext cx="1218136" cy="402333"/>
+          </a:xfrm>
+          <a:prstGeom prst="roundRect">
+            <a:avLst>
+              <a:gd name="adj" fmla="val 20588"/>
+            </a:avLst>
+          </a:prstGeom>
+          <a:ln/>
+        </p:spPr>
+        <p:style>
+          <a:lnRef idx="2">
+            <a:schemeClr val="accent2"/>
+          </a:lnRef>
+          <a:fillRef idx="1">
+            <a:schemeClr val="lt1"/>
+          </a:fillRef>
+          <a:effectRef idx="0">
+            <a:schemeClr val="accent2"/>
+          </a:effectRef>
+          <a:fontRef idx="minor">
+            <a:schemeClr val="dk1"/>
+          </a:fontRef>
+        </p:style>
+        <p:txBody>
+          <a:bodyPr rtlCol="0" anchor="ctr"/>
+          <a:lstStyle/>
+          <a:p>
+            <a:pPr algn="ctr"/>
+            <a:r>
+              <a:rPr lang="en-US" sz="1400" dirty="0">
+                <a:latin typeface="Courier New" panose="02070309020205020404" pitchFamily="49" charset="0"/>
+                <a:cs typeface="Courier New" panose="02070309020205020404" pitchFamily="49" charset="0"/>
+              </a:rPr>
+              <a:t>name(str)</a:t>
+            </a:r>
+          </a:p>
+          <a:p>
+            <a:pPr algn="ctr"/>
+            <a:r>
+              <a:rPr lang="en-US" sz="1400" dirty="0">
+                <a:latin typeface="Courier New" panose="02070309020205020404" pitchFamily="49" charset="0"/>
+                <a:cs typeface="Courier New" panose="02070309020205020404" pitchFamily="49" charset="0"/>
+              </a:rPr>
+              <a:t>age(int)</a:t>
+            </a:r>
+          </a:p>
+        </p:txBody>
+      </p:sp>
+      <p:cxnSp>
+        <p:nvCxnSpPr>
+          <p:cNvPr id="8" name="Straight Arrow Connector 7">
+            <a:extLst>
+              <a:ext uri="{FF2B5EF4-FFF2-40B4-BE49-F238E27FC236}">
+                <a16:creationId xmlns:a16="http://schemas.microsoft.com/office/drawing/2014/main" id="{09E5B3B0-85E6-4144-8060-64D6F63282FA}"/>
+              </a:ext>
+            </a:extLst>
+          </p:cNvPr>
+          <p:cNvCxnSpPr>
+            <a:cxnSpLocks/>
+            <a:stCxn id="5" idx="2"/>
+            <a:endCxn id="9" idx="0"/>
+          </p:cNvCxnSpPr>
+          <p:nvPr/>
+        </p:nvCxnSpPr>
+        <p:spPr>
+          <a:xfrm flipH="1">
+            <a:off x="6826026" y="1649757"/>
+            <a:ext cx="2" cy="339654"/>
+          </a:xfrm>
+          <a:prstGeom prst="straightConnector1">
+            <a:avLst/>
+          </a:prstGeom>
+          <a:ln w="12700">
+            <a:solidFill>
+              <a:schemeClr val="tx1"/>
+            </a:solidFill>
+            <a:tailEnd type="triangle"/>
+          </a:ln>
+        </p:spPr>
+        <p:style>
+          <a:lnRef idx="1">
+            <a:schemeClr val="accent1"/>
+          </a:lnRef>
+          <a:fillRef idx="0">
+            <a:schemeClr val="accent1"/>
+          </a:fillRef>
+          <a:effectRef idx="0">
+            <a:schemeClr val="accent1"/>
+          </a:effectRef>
+          <a:fontRef idx="minor">
+            <a:schemeClr val="tx1"/>
+          </a:fontRef>
+        </p:style>
+      </p:cxnSp>
+      <p:sp>
+        <p:nvSpPr>
+          <p:cNvPr id="12" name="Rounded Rectangle 11">
+            <a:extLst>
+              <a:ext uri="{FF2B5EF4-FFF2-40B4-BE49-F238E27FC236}">
+                <a16:creationId xmlns:a16="http://schemas.microsoft.com/office/drawing/2014/main" id="{8952281D-2D14-194E-9330-EDC5718B14AB}"/>
+              </a:ext>
+            </a:extLst>
+          </p:cNvPr>
+          <p:cNvSpPr/>
+          <p:nvPr/>
+        </p:nvSpPr>
+        <p:spPr>
+          <a:xfrm>
+            <a:off x="5250667" y="3636693"/>
+            <a:ext cx="1015116" cy="276225"/>
+          </a:xfrm>
+          <a:prstGeom prst="roundRect">
+            <a:avLst>
+              <a:gd name="adj" fmla="val 20588"/>
+            </a:avLst>
+          </a:prstGeom>
+          <a:ln/>
+        </p:spPr>
+        <p:style>
+          <a:lnRef idx="2">
+            <a:schemeClr val="accent2"/>
+          </a:lnRef>
+          <a:fillRef idx="1">
+            <a:schemeClr val="lt1"/>
+          </a:fillRef>
+          <a:effectRef idx="0">
+            <a:schemeClr val="accent2"/>
+          </a:effectRef>
+          <a:fontRef idx="minor">
+            <a:schemeClr val="dk1"/>
+          </a:fontRef>
+        </p:style>
+        <p:txBody>
+          <a:bodyPr rtlCol="0" anchor="ctr"/>
+          <a:lstStyle/>
+          <a:p>
+            <a:pPr algn="ctr"/>
+            <a:r>
+              <a:rPr lang="en-US" sz="1400" dirty="0">
+                <a:latin typeface="Courier New" panose="02070309020205020404" pitchFamily="49" charset="0"/>
+                <a:cs typeface="Courier New" panose="02070309020205020404" pitchFamily="49" charset="0"/>
+              </a:rPr>
+              <a:t>“Sorry”</a:t>
+            </a:r>
+            <a:endParaRPr lang="en-US" sz="1600" dirty="0">
+              <a:latin typeface="Courier New" panose="02070309020205020404" pitchFamily="49" charset="0"/>
+              <a:cs typeface="Courier New" panose="02070309020205020404" pitchFamily="49" charset="0"/>
+            </a:endParaRPr>
+          </a:p>
+        </p:txBody>
+      </p:sp>
+      <p:sp>
+        <p:nvSpPr>
+          <p:cNvPr id="14" name="Rounded Rectangle 13">
+            <a:extLst>
+              <a:ext uri="{FF2B5EF4-FFF2-40B4-BE49-F238E27FC236}">
+                <a16:creationId xmlns:a16="http://schemas.microsoft.com/office/drawing/2014/main" id="{3239951A-D46C-5F4E-9C20-D74E3D0695A0}"/>
+              </a:ext>
+            </a:extLst>
+          </p:cNvPr>
+          <p:cNvSpPr/>
+          <p:nvPr/>
+        </p:nvSpPr>
+        <p:spPr>
+          <a:xfrm>
+            <a:off x="7474996" y="3452062"/>
+            <a:ext cx="773724" cy="460856"/>
+          </a:xfrm>
+          <a:prstGeom prst="roundRect">
+            <a:avLst>
+              <a:gd name="adj" fmla="val 20588"/>
+            </a:avLst>
+          </a:prstGeom>
+          <a:ln/>
+        </p:spPr>
+        <p:style>
+          <a:lnRef idx="2">
+            <a:schemeClr val="accent2"/>
+          </a:lnRef>
+          <a:fillRef idx="1">
+            <a:schemeClr val="lt1"/>
+          </a:fillRef>
+          <a:effectRef idx="0">
+            <a:schemeClr val="accent2"/>
+          </a:effectRef>
+          <a:fontRef idx="minor">
+            <a:schemeClr val="dk1"/>
+          </a:fontRef>
+        </p:style>
+        <p:txBody>
+          <a:bodyPr rtlCol="0" anchor="ctr"/>
+          <a:lstStyle/>
+          <a:p>
+            <a:pPr algn="ctr"/>
+            <a:r>
+              <a:rPr lang="en-US" sz="1400" dirty="0">
+                <a:latin typeface="Courier New" panose="02070309020205020404" pitchFamily="49" charset="0"/>
+                <a:cs typeface="Courier New" panose="02070309020205020404" pitchFamily="49" charset="0"/>
+              </a:rPr>
+              <a:t>“Good news”</a:t>
+            </a:r>
+          </a:p>
+        </p:txBody>
+      </p:sp>
+      <p:cxnSp>
+        <p:nvCxnSpPr>
+          <p:cNvPr id="15" name="Straight Arrow Connector 14">
+            <a:extLst>
+              <a:ext uri="{FF2B5EF4-FFF2-40B4-BE49-F238E27FC236}">
+                <a16:creationId xmlns:a16="http://schemas.microsoft.com/office/drawing/2014/main" id="{26BD55B8-F0E3-FF4E-8F11-E7B3A547AD88}"/>
+              </a:ext>
+            </a:extLst>
+          </p:cNvPr>
+          <p:cNvCxnSpPr>
+            <a:cxnSpLocks/>
+            <a:endCxn id="19" idx="0"/>
+          </p:cNvCxnSpPr>
+          <p:nvPr/>
+        </p:nvCxnSpPr>
+        <p:spPr>
+          <a:xfrm flipH="1">
+            <a:off x="6826026" y="2403894"/>
+            <a:ext cx="2" cy="415233"/>
+          </a:xfrm>
+          <a:prstGeom prst="straightConnector1">
+            <a:avLst/>
+          </a:prstGeom>
+          <a:ln w="12700">
+            <a:solidFill>
+              <a:schemeClr val="tx1"/>
+            </a:solidFill>
+            <a:tailEnd type="triangle"/>
+          </a:ln>
+        </p:spPr>
+        <p:style>
+          <a:lnRef idx="1">
+            <a:schemeClr val="accent1"/>
+          </a:lnRef>
+          <a:fillRef idx="0">
+            <a:schemeClr val="accent1"/>
+          </a:fillRef>
+          <a:effectRef idx="0">
+            <a:schemeClr val="accent1"/>
+          </a:effectRef>
+          <a:fontRef idx="minor">
+            <a:schemeClr val="tx1"/>
+          </a:fontRef>
+        </p:style>
+      </p:cxnSp>
+      <p:sp>
+        <p:nvSpPr>
+          <p:cNvPr id="18" name="TextBox 17">
+            <a:extLst>
+              <a:ext uri="{FF2B5EF4-FFF2-40B4-BE49-F238E27FC236}">
+                <a16:creationId xmlns:a16="http://schemas.microsoft.com/office/drawing/2014/main" id="{F686723B-DE28-0E4E-9169-E0CB7459684C}"/>
+              </a:ext>
+            </a:extLst>
+          </p:cNvPr>
+          <p:cNvSpPr txBox="1"/>
+          <p:nvPr/>
+        </p:nvSpPr>
+        <p:spPr>
+          <a:xfrm>
+            <a:off x="-1809617" y="-735357"/>
+            <a:ext cx="0" cy="0"/>
+          </a:xfrm>
+          <a:prstGeom prst="rect">
+            <a:avLst/>
+          </a:prstGeom>
+          <a:noFill/>
+        </p:spPr>
+        <p:txBody>
+          <a:bodyPr wrap="none" lIns="0" tIns="0" rIns="0" bIns="0" rtlCol="0">
+            <a:noAutofit/>
+          </a:bodyPr>
+          <a:lstStyle/>
+          <a:p>
+            <a:pPr marL="179388" indent="-179388">
+              <a:buClr>
+                <a:schemeClr val="accent1"/>
+              </a:buClr>
+              <a:buFont typeface="Arial" panose="020B0604020202020204" pitchFamily="34" charset="0"/>
+              <a:buChar char="•"/>
+            </a:pPr>
+            <a:endParaRPr lang="en-US" sz="1600" dirty="0"/>
+          </a:p>
+        </p:txBody>
+      </p:sp>
+      <p:sp>
+        <p:nvSpPr>
+          <p:cNvPr id="19" name="Diamond 18">
+            <a:extLst>
+              <a:ext uri="{FF2B5EF4-FFF2-40B4-BE49-F238E27FC236}">
+                <a16:creationId xmlns:a16="http://schemas.microsoft.com/office/drawing/2014/main" id="{4B814058-39B3-6942-A8BB-34849F589E37}"/>
+              </a:ext>
+            </a:extLst>
+          </p:cNvPr>
+          <p:cNvSpPr/>
+          <p:nvPr/>
+        </p:nvSpPr>
+        <p:spPr>
+          <a:xfrm>
+            <a:off x="5981964" y="2819127"/>
+            <a:ext cx="1688123" cy="402333"/>
+          </a:xfrm>
+          <a:prstGeom prst="diamond">
+            <a:avLst/>
+          </a:prstGeom>
+          <a:ln/>
+        </p:spPr>
+        <p:style>
+          <a:lnRef idx="2">
+            <a:schemeClr val="accent1"/>
+          </a:lnRef>
+          <a:fillRef idx="1">
+            <a:schemeClr val="lt1"/>
+          </a:fillRef>
+          <a:effectRef idx="0">
+            <a:schemeClr val="accent1"/>
+          </a:effectRef>
+          <a:fontRef idx="minor">
+            <a:schemeClr val="dk1"/>
+          </a:fontRef>
+        </p:style>
+        <p:txBody>
+          <a:bodyPr rtlCol="0" anchor="ctr"/>
+          <a:lstStyle/>
+          <a:p>
+            <a:pPr algn="ctr"/>
+            <a:r>
+              <a:rPr lang="en-US" sz="1400" dirty="0">
+                <a:latin typeface="Courier New" panose="02070309020205020404" pitchFamily="49" charset="0"/>
+                <a:cs typeface="Courier New" panose="02070309020205020404" pitchFamily="49" charset="0"/>
+              </a:rPr>
+              <a:t>age&gt;19</a:t>
+            </a:r>
+          </a:p>
+        </p:txBody>
+      </p:sp>
+      <p:cxnSp>
+        <p:nvCxnSpPr>
+          <p:cNvPr id="28" name="Elbow Connector 27">
+            <a:extLst>
+              <a:ext uri="{FF2B5EF4-FFF2-40B4-BE49-F238E27FC236}">
+                <a16:creationId xmlns:a16="http://schemas.microsoft.com/office/drawing/2014/main" id="{E6BE9405-4640-2145-B78A-1A9B654A83EE}"/>
+              </a:ext>
+            </a:extLst>
+          </p:cNvPr>
+          <p:cNvCxnSpPr>
+            <a:cxnSpLocks/>
+            <a:stCxn id="19" idx="1"/>
+            <a:endCxn id="12" idx="0"/>
+          </p:cNvCxnSpPr>
+          <p:nvPr/>
+        </p:nvCxnSpPr>
+        <p:spPr>
+          <a:xfrm rot="10800000" flipV="1">
+            <a:off x="5758226" y="3020293"/>
+            <a:ext cx="223739" cy="616399"/>
+          </a:xfrm>
+          <a:prstGeom prst="bentConnector2">
+            <a:avLst/>
+          </a:prstGeom>
+          <a:ln w="12700">
+            <a:solidFill>
+              <a:schemeClr val="tx1"/>
+            </a:solidFill>
+            <a:tailEnd type="triangle"/>
+          </a:ln>
+        </p:spPr>
+        <p:style>
+          <a:lnRef idx="1">
+            <a:schemeClr val="accent1"/>
+          </a:lnRef>
+          <a:fillRef idx="0">
+            <a:schemeClr val="accent1"/>
+          </a:fillRef>
+          <a:effectRef idx="0">
+            <a:schemeClr val="accent1"/>
+          </a:effectRef>
+          <a:fontRef idx="minor">
+            <a:schemeClr val="tx1"/>
+          </a:fontRef>
+        </p:style>
+      </p:cxnSp>
+      <p:cxnSp>
+        <p:nvCxnSpPr>
+          <p:cNvPr id="34" name="Elbow Connector 33">
+            <a:extLst>
+              <a:ext uri="{FF2B5EF4-FFF2-40B4-BE49-F238E27FC236}">
+                <a16:creationId xmlns:a16="http://schemas.microsoft.com/office/drawing/2014/main" id="{780B4810-8FAC-454F-B99D-D68CA39A7359}"/>
+              </a:ext>
+            </a:extLst>
+          </p:cNvPr>
+          <p:cNvCxnSpPr>
+            <a:stCxn id="19" idx="3"/>
+            <a:endCxn id="14" idx="0"/>
+          </p:cNvCxnSpPr>
+          <p:nvPr/>
+        </p:nvCxnSpPr>
+        <p:spPr>
+          <a:xfrm>
+            <a:off x="7670087" y="3020294"/>
+            <a:ext cx="191771" cy="431768"/>
+          </a:xfrm>
+          <a:prstGeom prst="bentConnector2">
+            <a:avLst/>
+          </a:prstGeom>
+          <a:ln w="12700">
+            <a:solidFill>
+              <a:schemeClr val="tx1"/>
+            </a:solidFill>
+            <a:tailEnd type="triangle"/>
+          </a:ln>
+        </p:spPr>
+        <p:style>
+          <a:lnRef idx="1">
+            <a:schemeClr val="accent1"/>
+          </a:lnRef>
+          <a:fillRef idx="0">
+            <a:schemeClr val="accent1"/>
+          </a:fillRef>
+          <a:effectRef idx="0">
+            <a:schemeClr val="accent1"/>
+          </a:effectRef>
+          <a:fontRef idx="minor">
+            <a:schemeClr val="tx1"/>
+          </a:fontRef>
+        </p:style>
+      </p:cxnSp>
+      <p:cxnSp>
+        <p:nvCxnSpPr>
+          <p:cNvPr id="36" name="Elbow Connector 35">
+            <a:extLst>
+              <a:ext uri="{FF2B5EF4-FFF2-40B4-BE49-F238E27FC236}">
+                <a16:creationId xmlns:a16="http://schemas.microsoft.com/office/drawing/2014/main" id="{538B0780-98CB-CB49-9AEE-F02D00662B42}"/>
+              </a:ext>
+            </a:extLst>
+          </p:cNvPr>
+          <p:cNvCxnSpPr>
+            <a:cxnSpLocks/>
+          </p:cNvCxnSpPr>
+          <p:nvPr/>
+        </p:nvCxnSpPr>
+        <p:spPr>
+          <a:xfrm rot="16200000" flipH="1">
+            <a:off x="5783561" y="3925113"/>
+            <a:ext cx="741760" cy="717368"/>
+          </a:xfrm>
+          <a:prstGeom prst="bentConnector3">
+            <a:avLst>
+              <a:gd name="adj1" fmla="val 99999"/>
+            </a:avLst>
+          </a:prstGeom>
+          <a:ln w="12700">
+            <a:solidFill>
+              <a:schemeClr val="tx1"/>
+            </a:solidFill>
+            <a:tailEnd type="triangle"/>
+          </a:ln>
+        </p:spPr>
+        <p:style>
+          <a:lnRef idx="1">
+            <a:schemeClr val="accent1"/>
+          </a:lnRef>
+          <a:fillRef idx="0">
+            <a:schemeClr val="accent1"/>
+          </a:fillRef>
+          <a:effectRef idx="0">
+            <a:schemeClr val="accent1"/>
+          </a:effectRef>
+          <a:fontRef idx="minor">
+            <a:schemeClr val="tx1"/>
+          </a:fontRef>
+        </p:style>
+      </p:cxnSp>
+      <p:cxnSp>
+        <p:nvCxnSpPr>
+          <p:cNvPr id="39" name="Elbow Connector 38">
+            <a:extLst>
+              <a:ext uri="{FF2B5EF4-FFF2-40B4-BE49-F238E27FC236}">
+                <a16:creationId xmlns:a16="http://schemas.microsoft.com/office/drawing/2014/main" id="{B0E1EA81-5BCE-824F-855D-9402D6CFF182}"/>
+              </a:ext>
+            </a:extLst>
+          </p:cNvPr>
+          <p:cNvCxnSpPr>
+            <a:cxnSpLocks/>
+          </p:cNvCxnSpPr>
+          <p:nvPr/>
+        </p:nvCxnSpPr>
+        <p:spPr>
+          <a:xfrm rot="5400000">
+            <a:off x="7217650" y="4010467"/>
+            <a:ext cx="741761" cy="546660"/>
+          </a:xfrm>
+          <a:prstGeom prst="bentConnector3">
+            <a:avLst>
+              <a:gd name="adj1" fmla="val 99137"/>
+            </a:avLst>
+          </a:prstGeom>
+          <a:ln w="12700">
+            <a:solidFill>
+              <a:schemeClr val="tx1"/>
+            </a:solidFill>
+            <a:tailEnd type="triangle"/>
+          </a:ln>
+        </p:spPr>
+        <p:style>
+          <a:lnRef idx="1">
+            <a:schemeClr val="accent1"/>
+          </a:lnRef>
+          <a:fillRef idx="0">
+            <a:schemeClr val="accent1"/>
+          </a:fillRef>
+          <a:effectRef idx="0">
+            <a:schemeClr val="accent1"/>
+          </a:effectRef>
+          <a:fontRef idx="minor">
+            <a:schemeClr val="tx1"/>
+          </a:fontRef>
+        </p:style>
+      </p:cxnSp>
+      <p:sp>
+        <p:nvSpPr>
+          <p:cNvPr id="59" name="Rounded Rectangle 58">
+            <a:extLst>
+              <a:ext uri="{FF2B5EF4-FFF2-40B4-BE49-F238E27FC236}">
+                <a16:creationId xmlns:a16="http://schemas.microsoft.com/office/drawing/2014/main" id="{479E92FC-4AB4-0849-A966-1F5159F8CC76}"/>
+              </a:ext>
+            </a:extLst>
+          </p:cNvPr>
+          <p:cNvSpPr/>
+          <p:nvPr/>
+        </p:nvSpPr>
+        <p:spPr>
+          <a:xfrm>
+            <a:off x="6488935" y="4516564"/>
+            <a:ext cx="850455" cy="276225"/>
+          </a:xfrm>
+          <a:prstGeom prst="roundRect">
+            <a:avLst>
+              <a:gd name="adj" fmla="val 20588"/>
+            </a:avLst>
+          </a:prstGeom>
+          <a:ln/>
+        </p:spPr>
+        <p:style>
+          <a:lnRef idx="2">
+            <a:schemeClr val="accent2"/>
+          </a:lnRef>
+          <a:fillRef idx="1">
+            <a:schemeClr val="lt1"/>
+          </a:fillRef>
+          <a:effectRef idx="0">
+            <a:schemeClr val="accent2"/>
+          </a:effectRef>
+          <a:fontRef idx="minor">
+            <a:schemeClr val="dk1"/>
+          </a:fontRef>
+        </p:style>
+        <p:txBody>
+          <a:bodyPr rtlCol="0" anchor="ctr"/>
+          <a:lstStyle/>
+          <a:p>
+            <a:pPr algn="ctr"/>
+            <a:r>
+              <a:rPr lang="en-US" sz="1400" dirty="0">
+                <a:latin typeface="Courier New" panose="02070309020205020404" pitchFamily="49" charset="0"/>
+                <a:cs typeface="Courier New" panose="02070309020205020404" pitchFamily="49" charset="0"/>
+              </a:rPr>
+              <a:t>end</a:t>
+            </a:r>
+            <a:endParaRPr lang="en-US" sz="1600" dirty="0">
+              <a:latin typeface="Courier New" panose="02070309020205020404" pitchFamily="49" charset="0"/>
+              <a:cs typeface="Courier New" panose="02070309020205020404" pitchFamily="49" charset="0"/>
+            </a:endParaRPr>
+          </a:p>
+        </p:txBody>
+      </p:sp>
+      <p:sp>
+        <p:nvSpPr>
+          <p:cNvPr id="60" name="TextBox 59">
+            <a:extLst>
+              <a:ext uri="{FF2B5EF4-FFF2-40B4-BE49-F238E27FC236}">
+                <a16:creationId xmlns:a16="http://schemas.microsoft.com/office/drawing/2014/main" id="{C5F56D06-71CE-1945-B694-A2C7723752E5}"/>
+              </a:ext>
+            </a:extLst>
+          </p:cNvPr>
+          <p:cNvSpPr txBox="1"/>
+          <p:nvPr/>
+        </p:nvSpPr>
+        <p:spPr>
+          <a:xfrm>
+            <a:off x="7880978" y="3102509"/>
+            <a:ext cx="433007" cy="276225"/>
+          </a:xfrm>
+          <a:prstGeom prst="rect">
+            <a:avLst/>
+          </a:prstGeom>
+          <a:noFill/>
+        </p:spPr>
+        <p:txBody>
+          <a:bodyPr wrap="none" lIns="0" tIns="0" rIns="0" bIns="0" rtlCol="0">
+            <a:noAutofit/>
+          </a:bodyPr>
+          <a:lstStyle/>
+          <a:p>
+            <a:pPr>
+              <a:buClr>
+                <a:schemeClr val="accent1"/>
+              </a:buClr>
+            </a:pPr>
+            <a:r>
+              <a:rPr lang="en-US" sz="1400" dirty="0">
+                <a:latin typeface="Courier New" panose="02070309020205020404" pitchFamily="49" charset="0"/>
+                <a:cs typeface="Courier New" panose="02070309020205020404" pitchFamily="49" charset="0"/>
+              </a:rPr>
+              <a:t>True</a:t>
+            </a:r>
+            <a:endParaRPr lang="en-US" sz="1600" dirty="0">
+              <a:latin typeface="Courier New" panose="02070309020205020404" pitchFamily="49" charset="0"/>
+              <a:cs typeface="Courier New" panose="02070309020205020404" pitchFamily="49" charset="0"/>
+            </a:endParaRPr>
+          </a:p>
+        </p:txBody>
+      </p:sp>
+      <p:sp>
+        <p:nvSpPr>
+          <p:cNvPr id="61" name="TextBox 60">
+            <a:extLst>
+              <a:ext uri="{FF2B5EF4-FFF2-40B4-BE49-F238E27FC236}">
+                <a16:creationId xmlns:a16="http://schemas.microsoft.com/office/drawing/2014/main" id="{C0071F27-3012-CC4D-9F77-74BAADAE00EB}"/>
+              </a:ext>
+            </a:extLst>
+          </p:cNvPr>
+          <p:cNvSpPr txBox="1"/>
+          <p:nvPr/>
+        </p:nvSpPr>
+        <p:spPr>
+          <a:xfrm>
+            <a:off x="5162095" y="3152851"/>
+            <a:ext cx="433007" cy="276225"/>
+          </a:xfrm>
+          <a:prstGeom prst="rect">
+            <a:avLst/>
+          </a:prstGeom>
+          <a:noFill/>
+        </p:spPr>
+        <p:txBody>
+          <a:bodyPr wrap="none" lIns="0" tIns="0" rIns="0" bIns="0" rtlCol="0">
+            <a:noAutofit/>
+          </a:bodyPr>
+          <a:lstStyle/>
+          <a:p>
+            <a:pPr>
+              <a:buClr>
+                <a:schemeClr val="accent1"/>
+              </a:buClr>
+            </a:pPr>
+            <a:r>
+              <a:rPr lang="en-US" sz="1400" dirty="0">
+                <a:latin typeface="Courier New" panose="02070309020205020404" pitchFamily="49" charset="0"/>
+                <a:cs typeface="Courier New" panose="02070309020205020404" pitchFamily="49" charset="0"/>
+              </a:rPr>
+              <a:t>False</a:t>
+            </a:r>
+            <a:endParaRPr lang="en-US" sz="1600" dirty="0">
+              <a:latin typeface="Courier New" panose="02070309020205020404" pitchFamily="49" charset="0"/>
+              <a:cs typeface="Courier New" panose="02070309020205020404" pitchFamily="49" charset="0"/>
+            </a:endParaRPr>
           </a:p>
         </p:txBody>
       </p:sp>
     </p:spTree>
     <p:extLst>
       <p:ext uri="{BB962C8B-B14F-4D97-AF65-F5344CB8AC3E}">
-        <p14:creationId xmlns:p14="http://schemas.microsoft.com/office/powerpoint/2010/main" val="3261678119"/>
+        <p14:creationId xmlns:p14="http://schemas.microsoft.com/office/powerpoint/2010/main" val="2004244462"/>
       </p:ext>
     </p:extLst>
   </p:cSld>
@@ -6045,7 +6031,221 @@
       </p:grpSpPr>
       <p:sp>
         <p:nvSpPr>
-          <p:cNvPr id="8" name="Inhaltsplatzhalter 7"/>
+          <p:cNvPr id="11" name="Ellipse 10"/>
+          <p:cNvSpPr/>
+          <p:nvPr/>
+        </p:nvSpPr>
+        <p:spPr>
+          <a:xfrm>
+            <a:off x="5429087" y="1552819"/>
+            <a:ext cx="2152185" cy="2152185"/>
+          </a:xfrm>
+          <a:prstGeom prst="ellipse">
+            <a:avLst/>
+          </a:prstGeom>
+          <a:ln>
+            <a:noFill/>
+          </a:ln>
+        </p:spPr>
+        <p:style>
+          <a:lnRef idx="2">
+            <a:schemeClr val="accent1">
+              <a:shade val="50000"/>
+            </a:schemeClr>
+          </a:lnRef>
+          <a:fillRef idx="1">
+            <a:schemeClr val="accent1"/>
+          </a:fillRef>
+          <a:effectRef idx="0">
+            <a:schemeClr val="accent1"/>
+          </a:effectRef>
+          <a:fontRef idx="minor">
+            <a:schemeClr val="lt1"/>
+          </a:fontRef>
+        </p:style>
+        <p:txBody>
+          <a:bodyPr rtlCol="0" anchor="ctr"/>
+          <a:lstStyle/>
+          <a:p>
+            <a:pPr algn="ctr"/>
+            <a:endParaRPr lang="en-US" sz="1600" dirty="0"/>
+          </a:p>
+        </p:txBody>
+      </p:sp>
+      <p:sp>
+        <p:nvSpPr>
+          <p:cNvPr id="8" name="Rechteck 7"/>
+          <p:cNvSpPr/>
+          <p:nvPr/>
+        </p:nvSpPr>
+        <p:spPr>
+          <a:xfrm>
+            <a:off x="0" y="0"/>
+            <a:ext cx="9144000" cy="1044102"/>
+          </a:xfrm>
+          <a:prstGeom prst="rect">
+            <a:avLst/>
+          </a:prstGeom>
+          <a:solidFill>
+            <a:schemeClr val="tx1">
+              <a:lumMod val="25000"/>
+              <a:lumOff val="75000"/>
+            </a:schemeClr>
+          </a:solidFill>
+          <a:ln>
+            <a:noFill/>
+          </a:ln>
+        </p:spPr>
+        <p:style>
+          <a:lnRef idx="2">
+            <a:schemeClr val="accent1">
+              <a:shade val="50000"/>
+            </a:schemeClr>
+          </a:lnRef>
+          <a:fillRef idx="1">
+            <a:schemeClr val="accent1"/>
+          </a:fillRef>
+          <a:effectRef idx="0">
+            <a:schemeClr val="accent1"/>
+          </a:effectRef>
+          <a:fontRef idx="minor">
+            <a:schemeClr val="lt1"/>
+          </a:fontRef>
+        </p:style>
+        <p:txBody>
+          <a:bodyPr rtlCol="0" anchor="ctr"/>
+          <a:lstStyle/>
+          <a:p>
+            <a:pPr algn="ctr"/>
+            <a:endParaRPr lang="en-US" sz="1600" dirty="0"/>
+          </a:p>
+        </p:txBody>
+      </p:sp>
+      <p:sp>
+        <p:nvSpPr>
+          <p:cNvPr id="4" name="Textplatzhalter 3"/>
+          <p:cNvSpPr>
+            <a:spLocks noGrp="1"/>
+          </p:cNvSpPr>
+          <p:nvPr>
+            <p:ph type="body" sz="quarter" idx="13"/>
+          </p:nvPr>
+        </p:nvSpPr>
+        <p:spPr/>
+        <p:txBody>
+          <a:bodyPr/>
+          <a:lstStyle/>
+          <a:p>
+            <a:r>
+              <a:rPr lang="en-US" dirty="0"/>
+              <a:t>Thank you for your attention!</a:t>
+            </a:r>
+          </a:p>
+        </p:txBody>
+      </p:sp>
+      <p:sp>
+        <p:nvSpPr>
+          <p:cNvPr id="2" name="Titel 1"/>
+          <p:cNvSpPr>
+            <a:spLocks noGrp="1"/>
+          </p:cNvSpPr>
+          <p:nvPr>
+            <p:ph type="title"/>
+          </p:nvPr>
+        </p:nvSpPr>
+        <p:spPr>
+          <a:xfrm>
+            <a:off x="468000" y="202847"/>
+            <a:ext cx="8207375" cy="278290"/>
+          </a:xfrm>
+        </p:spPr>
+        <p:txBody>
+          <a:bodyPr/>
+          <a:lstStyle/>
+          <a:p>
+            <a:r>
+              <a:rPr lang="en-US" dirty="0"/>
+              <a:t>Acknowledgement</a:t>
+            </a:r>
+          </a:p>
+        </p:txBody>
+      </p:sp>
+      <p:cxnSp>
+        <p:nvCxnSpPr>
+          <p:cNvPr id="10" name="Gerader Verbinder 9"/>
+          <p:cNvCxnSpPr/>
+          <p:nvPr/>
+        </p:nvCxnSpPr>
+        <p:spPr>
+          <a:xfrm>
+            <a:off x="-6485" y="1044102"/>
+            <a:ext cx="9156970" cy="0"/>
+          </a:xfrm>
+          <a:prstGeom prst="line">
+            <a:avLst/>
+          </a:prstGeom>
+          <a:ln w="38100">
+            <a:solidFill>
+              <a:schemeClr val="tx1">
+                <a:lumMod val="75000"/>
+                <a:lumOff val="25000"/>
+              </a:schemeClr>
+            </a:solidFill>
+          </a:ln>
+        </p:spPr>
+        <p:style>
+          <a:lnRef idx="1">
+            <a:schemeClr val="accent1"/>
+          </a:lnRef>
+          <a:fillRef idx="0">
+            <a:schemeClr val="accent1"/>
+          </a:fillRef>
+          <a:effectRef idx="0">
+            <a:schemeClr val="accent1"/>
+          </a:effectRef>
+          <a:fontRef idx="minor">
+            <a:schemeClr val="tx1"/>
+          </a:fontRef>
+        </p:style>
+      </p:cxnSp>
+      <p:cxnSp>
+        <p:nvCxnSpPr>
+          <p:cNvPr id="14" name="Gerader Verbinder 13"/>
+          <p:cNvCxnSpPr/>
+          <p:nvPr/>
+        </p:nvCxnSpPr>
+        <p:spPr>
+          <a:xfrm>
+            <a:off x="-12970" y="5308059"/>
+            <a:ext cx="9156970" cy="0"/>
+          </a:xfrm>
+          <a:prstGeom prst="line">
+            <a:avLst/>
+          </a:prstGeom>
+          <a:ln w="19050">
+            <a:solidFill>
+              <a:schemeClr val="accent1"/>
+            </a:solidFill>
+          </a:ln>
+        </p:spPr>
+        <p:style>
+          <a:lnRef idx="1">
+            <a:schemeClr val="accent1"/>
+          </a:lnRef>
+          <a:fillRef idx="0">
+            <a:schemeClr val="accent1"/>
+          </a:fillRef>
+          <a:effectRef idx="0">
+            <a:schemeClr val="accent1"/>
+          </a:effectRef>
+          <a:fontRef idx="minor">
+            <a:schemeClr val="tx1"/>
+          </a:fontRef>
+        </p:style>
+      </p:cxnSp>
+      <p:sp>
+        <p:nvSpPr>
+          <p:cNvPr id="16" name="Content Placeholder 3"/>
           <p:cNvSpPr>
             <a:spLocks noGrp="1"/>
           </p:cNvSpPr>
@@ -6053,76 +6253,244 @@
             <p:ph idx="1"/>
           </p:nvPr>
         </p:nvSpPr>
-        <p:spPr/>
+        <p:spPr>
+          <a:xfrm>
+            <a:off x="5714816" y="2370419"/>
+            <a:ext cx="1580726" cy="516983"/>
+          </a:xfrm>
+        </p:spPr>
         <p:txBody>
           <a:bodyPr/>
           <a:lstStyle/>
           <a:p>
-            <a:endParaRPr lang="en-US" dirty="0"/>
-          </a:p>
-        </p:txBody>
-      </p:sp>
-      <p:sp>
-        <p:nvSpPr>
-          <p:cNvPr id="9" name="Textplatzhalter 8"/>
-          <p:cNvSpPr>
-            <a:spLocks noGrp="1"/>
-          </p:cNvSpPr>
-          <p:nvPr>
-            <p:ph type="body" sz="quarter" idx="13"/>
-          </p:nvPr>
-        </p:nvSpPr>
-        <p:spPr/>
-        <p:txBody>
-          <a:bodyPr/>
-          <a:lstStyle/>
-          <a:p>
-            <a:endParaRPr lang="en-US" dirty="0"/>
-          </a:p>
-        </p:txBody>
-      </p:sp>
-      <p:sp>
-        <p:nvSpPr>
-          <p:cNvPr id="7" name="Titel 6"/>
-          <p:cNvSpPr>
-            <a:spLocks noGrp="1"/>
-          </p:cNvSpPr>
-          <p:nvPr>
-            <p:ph type="title"/>
-          </p:nvPr>
-        </p:nvSpPr>
-        <p:spPr/>
-        <p:txBody>
-          <a:bodyPr/>
-          <a:lstStyle/>
-          <a:p>
-            <a:endParaRPr lang="en-US" dirty="0"/>
-          </a:p>
-        </p:txBody>
-      </p:sp>
-      <p:sp>
-        <p:nvSpPr>
-          <p:cNvPr id="10" name="Inhaltsplatzhalter 9"/>
-          <p:cNvSpPr>
-            <a:spLocks noGrp="1"/>
-          </p:cNvSpPr>
-          <p:nvPr>
-            <p:ph idx="14"/>
-          </p:nvPr>
-        </p:nvSpPr>
-        <p:spPr/>
-        <p:txBody>
-          <a:bodyPr/>
-          <a:lstStyle/>
-          <a:p>
-            <a:endParaRPr lang="en-US" dirty="0"/>
-          </a:p>
-        </p:txBody>
-      </p:sp>
+            <a:pPr marL="0" indent="0" algn="ctr">
+              <a:spcBef>
+                <a:spcPts val="0"/>
+              </a:spcBef>
+              <a:buNone/>
+            </a:pPr>
+            <a:r>
+              <a:rPr lang="de-DE" sz="1400" b="1" dirty="0"/>
+              <a:t>The </a:t>
+            </a:r>
+            <a:r>
+              <a:rPr lang="de-DE" sz="1400" b="1" dirty="0" err="1"/>
+              <a:t>group</a:t>
+            </a:r>
+            <a:r>
+              <a:rPr lang="de-DE" sz="1400" b="1" dirty="0"/>
+              <a:t> at </a:t>
+            </a:r>
+            <a:r>
+              <a:rPr lang="de-DE" sz="1400" b="1" dirty="0" err="1"/>
+              <a:t>the</a:t>
+            </a:r>
+            <a:r>
+              <a:rPr lang="de-DE" sz="1400" b="1" dirty="0"/>
+              <a:t> IBVT Stuttgart</a:t>
+            </a:r>
+          </a:p>
+        </p:txBody>
+      </p:sp>
+      <p:grpSp>
+        <p:nvGrpSpPr>
+          <p:cNvPr id="18" name="Gruppieren 17"/>
+          <p:cNvGrpSpPr/>
+          <p:nvPr/>
+        </p:nvGrpSpPr>
+        <p:grpSpPr>
+          <a:xfrm>
+            <a:off x="3485040" y="2607576"/>
+            <a:ext cx="2448496" cy="2448496"/>
+            <a:chOff x="5305977" y="2430758"/>
+            <a:chExt cx="2448496" cy="2448496"/>
+          </a:xfrm>
+        </p:grpSpPr>
+        <p:sp>
+          <p:nvSpPr>
+            <p:cNvPr id="17" name="Ellipse 16"/>
+            <p:cNvSpPr/>
+            <p:nvPr/>
+          </p:nvSpPr>
+          <p:spPr>
+            <a:xfrm>
+              <a:off x="5305977" y="2430758"/>
+              <a:ext cx="2448496" cy="2448496"/>
+            </a:xfrm>
+            <a:prstGeom prst="ellipse">
+              <a:avLst/>
+            </a:prstGeom>
+            <a:solidFill>
+              <a:srgbClr val="CCCCCC"/>
+            </a:solidFill>
+            <a:ln>
+              <a:noFill/>
+            </a:ln>
+          </p:spPr>
+          <p:style>
+            <a:lnRef idx="2">
+              <a:schemeClr val="accent1">
+                <a:shade val="50000"/>
+              </a:schemeClr>
+            </a:lnRef>
+            <a:fillRef idx="1">
+              <a:schemeClr val="accent1"/>
+            </a:fillRef>
+            <a:effectRef idx="0">
+              <a:schemeClr val="accent1"/>
+            </a:effectRef>
+            <a:fontRef idx="minor">
+              <a:schemeClr val="lt1"/>
+            </a:fontRef>
+          </p:style>
+          <p:txBody>
+            <a:bodyPr rtlCol="0" anchor="ctr"/>
+            <a:lstStyle/>
+            <a:p>
+              <a:pPr algn="ctr"/>
+              <a:endParaRPr lang="en-US" sz="1600" dirty="0"/>
+            </a:p>
+          </p:txBody>
+        </p:sp>
+        <p:pic>
+          <p:nvPicPr>
+            <p:cNvPr id="15" name="Picture 2" descr="https://upload.wikimedia.org/wikipedia/commons/thumb/5/5c/BMBF_Logo.svg/2000px-BMBF_Logo.svg.png"/>
+            <p:cNvPicPr>
+              <a:picLocks noChangeAspect="1" noChangeArrowheads="1"/>
+            </p:cNvPicPr>
+            <p:nvPr/>
+          </p:nvPicPr>
+          <p:blipFill>
+            <a:blip r:embed="rId3" cstate="print">
+              <a:extLst>
+                <a:ext uri="{28A0092B-C50C-407E-A947-70E740481C1C}">
+                  <a14:useLocalDpi xmlns:a14="http://schemas.microsoft.com/office/drawing/2010/main" val="0"/>
+                </a:ext>
+              </a:extLst>
+            </a:blip>
+            <a:srcRect/>
+            <a:stretch>
+              <a:fillRect/>
+            </a:stretch>
+          </p:blipFill>
+          <p:spPr bwMode="auto">
+            <a:xfrm>
+              <a:off x="5383990" y="3267534"/>
+              <a:ext cx="2292471" cy="1182914"/>
+            </a:xfrm>
+            <a:prstGeom prst="rect">
+              <a:avLst/>
+            </a:prstGeom>
+            <a:noFill/>
+            <a:extLst>
+              <a:ext uri="{909E8E84-426E-40DD-AFC4-6F175D3DCCD1}">
+                <a14:hiddenFill xmlns:a14="http://schemas.microsoft.com/office/drawing/2010/main">
+                  <a:solidFill>
+                    <a:srgbClr val="FFFFFF"/>
+                  </a:solidFill>
+                </a14:hiddenFill>
+              </a:ext>
+            </a:extLst>
+          </p:spPr>
+        </p:pic>
+      </p:grpSp>
+      <p:grpSp>
+        <p:nvGrpSpPr>
+          <p:cNvPr id="19" name="Gruppieren 18"/>
+          <p:cNvGrpSpPr/>
+          <p:nvPr/>
+        </p:nvGrpSpPr>
+        <p:grpSpPr>
+          <a:xfrm>
+            <a:off x="1447789" y="1757147"/>
+            <a:ext cx="2329605" cy="2329605"/>
+            <a:chOff x="2508657" y="1362437"/>
+            <a:chExt cx="2329605" cy="2329605"/>
+          </a:xfrm>
+        </p:grpSpPr>
+        <p:sp>
+          <p:nvSpPr>
+            <p:cNvPr id="3" name="Ellipse 2"/>
+            <p:cNvSpPr/>
+            <p:nvPr/>
+          </p:nvSpPr>
+          <p:spPr>
+            <a:xfrm>
+              <a:off x="2508657" y="1362437"/>
+              <a:ext cx="2329605" cy="2329605"/>
+            </a:xfrm>
+            <a:prstGeom prst="ellipse">
+              <a:avLst/>
+            </a:prstGeom>
+            <a:solidFill>
+              <a:schemeClr val="tx1"/>
+            </a:solidFill>
+            <a:ln>
+              <a:noFill/>
+            </a:ln>
+          </p:spPr>
+          <p:style>
+            <a:lnRef idx="2">
+              <a:schemeClr val="accent1">
+                <a:shade val="50000"/>
+              </a:schemeClr>
+            </a:lnRef>
+            <a:fillRef idx="1">
+              <a:schemeClr val="accent1"/>
+            </a:fillRef>
+            <a:effectRef idx="0">
+              <a:schemeClr val="accent1"/>
+            </a:effectRef>
+            <a:fontRef idx="minor">
+              <a:schemeClr val="lt1"/>
+            </a:fontRef>
+          </p:style>
+          <p:txBody>
+            <a:bodyPr rtlCol="0" anchor="ctr"/>
+            <a:lstStyle/>
+            <a:p>
+              <a:pPr algn="ctr"/>
+              <a:endParaRPr lang="en-US" sz="1600" dirty="0"/>
+            </a:p>
+          </p:txBody>
+        </p:sp>
+        <p:sp>
+          <p:nvSpPr>
+            <p:cNvPr id="9" name="Rechteck 8"/>
+            <p:cNvSpPr/>
+            <p:nvPr/>
+          </p:nvSpPr>
+          <p:spPr>
+            <a:xfrm>
+              <a:off x="2789286" y="2006407"/>
+              <a:ext cx="1886849" cy="338554"/>
+            </a:xfrm>
+            <a:prstGeom prst="rect">
+              <a:avLst/>
+            </a:prstGeom>
+          </p:spPr>
+          <p:txBody>
+            <a:bodyPr wrap="square">
+              <a:spAutoFit/>
+            </a:bodyPr>
+            <a:lstStyle/>
+            <a:p>
+              <a:r>
+                <a:rPr lang="en-US" sz="1600" dirty="0">
+                  <a:solidFill>
+                    <a:schemeClr val="bg1"/>
+                  </a:solidFill>
+                </a:rPr>
+                <a:t>Thanks to</a:t>
+              </a:r>
+            </a:p>
+          </p:txBody>
+        </p:sp>
+      </p:grpSp>
     </p:spTree>
     <p:extLst>
       <p:ext uri="{BB962C8B-B14F-4D97-AF65-F5344CB8AC3E}">
-        <p14:creationId xmlns:p14="http://schemas.microsoft.com/office/powerpoint/2010/main" val="4191762823"/>
+        <p14:creationId xmlns:p14="http://schemas.microsoft.com/office/powerpoint/2010/main" val="3548696649"/>
       </p:ext>
     </p:extLst>
   </p:cSld>
@@ -6151,26 +6519,56 @@
       </p:grpSpPr>
       <p:sp>
         <p:nvSpPr>
-          <p:cNvPr id="9" name="Inhaltsplatzhalter 8"/>
-          <p:cNvSpPr>
-            <a:spLocks noGrp="1"/>
-          </p:cNvSpPr>
-          <p:nvPr>
-            <p:ph idx="1"/>
-          </p:nvPr>
-        </p:nvSpPr>
-        <p:spPr/>
-        <p:txBody>
-          <a:bodyPr/>
+          <p:cNvPr id="8" name="Rechteck 7"/>
+          <p:cNvSpPr/>
+          <p:nvPr/>
+        </p:nvSpPr>
+        <p:spPr>
+          <a:xfrm>
+            <a:off x="0" y="0"/>
+            <a:ext cx="9144000" cy="1044102"/>
+          </a:xfrm>
+          <a:prstGeom prst="rect">
+            <a:avLst/>
+          </a:prstGeom>
+          <a:solidFill>
+            <a:schemeClr val="tx1">
+              <a:lumMod val="25000"/>
+              <a:lumOff val="75000"/>
+            </a:schemeClr>
+          </a:solidFill>
+          <a:ln>
+            <a:noFill/>
+          </a:ln>
+        </p:spPr>
+        <p:style>
+          <a:lnRef idx="2">
+            <a:schemeClr val="accent1">
+              <a:shade val="50000"/>
+            </a:schemeClr>
+          </a:lnRef>
+          <a:fillRef idx="1">
+            <a:schemeClr val="accent1"/>
+          </a:fillRef>
+          <a:effectRef idx="0">
+            <a:schemeClr val="accent1"/>
+          </a:effectRef>
+          <a:fontRef idx="minor">
+            <a:schemeClr val="lt1"/>
+          </a:fontRef>
+        </p:style>
+        <p:txBody>
+          <a:bodyPr rtlCol="0" anchor="ctr"/>
           <a:lstStyle/>
           <a:p>
-            <a:endParaRPr lang="en-US" dirty="0"/>
-          </a:p>
-        </p:txBody>
-      </p:sp>
-      <p:sp>
-        <p:nvSpPr>
-          <p:cNvPr id="10" name="Textplatzhalter 9"/>
+            <a:pPr algn="ctr"/>
+            <a:endParaRPr lang="en-US" sz="1600" dirty="0"/>
+          </a:p>
+        </p:txBody>
+      </p:sp>
+      <p:sp>
+        <p:nvSpPr>
+          <p:cNvPr id="4" name="Textplatzhalter 3"/>
           <p:cNvSpPr>
             <a:spLocks noGrp="1"/>
           </p:cNvSpPr>
@@ -6183,13 +6581,16 @@
           <a:bodyPr/>
           <a:lstStyle/>
           <a:p>
-            <a:endParaRPr lang="en-US" dirty="0"/>
-          </a:p>
-        </p:txBody>
-      </p:sp>
-      <p:sp>
-        <p:nvSpPr>
-          <p:cNvPr id="8" name="Titel 7"/>
+            <a:r>
+              <a:rPr lang="en-US" dirty="0"/>
+              <a:t>BSD</a:t>
+            </a:r>
+          </a:p>
+        </p:txBody>
+      </p:sp>
+      <p:sp>
+        <p:nvSpPr>
+          <p:cNvPr id="2" name="Titel 1"/>
           <p:cNvSpPr>
             <a:spLocks noGrp="1"/>
           </p:cNvSpPr>
@@ -6197,253 +6598,108 @@
             <p:ph type="title"/>
           </p:nvPr>
         </p:nvSpPr>
-        <p:spPr/>
+        <p:spPr>
+          <a:xfrm>
+            <a:off x="468000" y="202847"/>
+            <a:ext cx="8207375" cy="278290"/>
+          </a:xfrm>
+        </p:spPr>
         <p:txBody>
           <a:bodyPr/>
           <a:lstStyle/>
           <a:p>
-            <a:endParaRPr lang="en-US" dirty="0"/>
-          </a:p>
-        </p:txBody>
-      </p:sp>
-      <p:sp>
-        <p:nvSpPr>
-          <p:cNvPr id="11" name="Bildplatzhalter 10"/>
-          <p:cNvSpPr>
-            <a:spLocks noGrp="1"/>
-          </p:cNvSpPr>
-          <p:nvPr>
-            <p:ph type="pic" sz="quarter" idx="14"/>
-          </p:nvPr>
-        </p:nvSpPr>
-        <p:spPr/>
-      </p:sp>
+            <a:r>
+              <a:rPr lang="en-US" dirty="0"/>
+              <a:t>Back-up</a:t>
+            </a:r>
+            <a:r>
+              <a:rPr lang="de-DE" dirty="0"/>
+              <a:t> </a:t>
+            </a:r>
+            <a:r>
+              <a:rPr lang="en-US" dirty="0"/>
+              <a:t>slides</a:t>
+            </a:r>
+          </a:p>
+        </p:txBody>
+      </p:sp>
+      <p:cxnSp>
+        <p:nvCxnSpPr>
+          <p:cNvPr id="10" name="Gerader Verbinder 9"/>
+          <p:cNvCxnSpPr/>
+          <p:nvPr/>
+        </p:nvCxnSpPr>
+        <p:spPr>
+          <a:xfrm>
+            <a:off x="-6485" y="1044102"/>
+            <a:ext cx="9156970" cy="0"/>
+          </a:xfrm>
+          <a:prstGeom prst="line">
+            <a:avLst/>
+          </a:prstGeom>
+          <a:ln w="38100">
+            <a:solidFill>
+              <a:schemeClr val="tx1">
+                <a:lumMod val="75000"/>
+                <a:lumOff val="25000"/>
+              </a:schemeClr>
+            </a:solidFill>
+          </a:ln>
+        </p:spPr>
+        <p:style>
+          <a:lnRef idx="1">
+            <a:schemeClr val="accent1"/>
+          </a:lnRef>
+          <a:fillRef idx="0">
+            <a:schemeClr val="accent1"/>
+          </a:fillRef>
+          <a:effectRef idx="0">
+            <a:schemeClr val="accent1"/>
+          </a:effectRef>
+          <a:fontRef idx="minor">
+            <a:schemeClr val="tx1"/>
+          </a:fontRef>
+        </p:style>
+      </p:cxnSp>
+      <p:cxnSp>
+        <p:nvCxnSpPr>
+          <p:cNvPr id="14" name="Gerader Verbinder 13"/>
+          <p:cNvCxnSpPr/>
+          <p:nvPr/>
+        </p:nvCxnSpPr>
+        <p:spPr>
+          <a:xfrm>
+            <a:off x="-12970" y="5308059"/>
+            <a:ext cx="9156970" cy="0"/>
+          </a:xfrm>
+          <a:prstGeom prst="line">
+            <a:avLst/>
+          </a:prstGeom>
+          <a:ln w="19050">
+            <a:solidFill>
+              <a:schemeClr val="accent1"/>
+            </a:solidFill>
+          </a:ln>
+        </p:spPr>
+        <p:style>
+          <a:lnRef idx="1">
+            <a:schemeClr val="accent1"/>
+          </a:lnRef>
+          <a:fillRef idx="0">
+            <a:schemeClr val="accent1"/>
+          </a:fillRef>
+          <a:effectRef idx="0">
+            <a:schemeClr val="accent1"/>
+          </a:effectRef>
+          <a:fontRef idx="minor">
+            <a:schemeClr val="tx1"/>
+          </a:fontRef>
+        </p:style>
+      </p:cxnSp>
     </p:spTree>
     <p:extLst>
       <p:ext uri="{BB962C8B-B14F-4D97-AF65-F5344CB8AC3E}">
-        <p14:creationId xmlns:p14="http://schemas.microsoft.com/office/powerpoint/2010/main" val="2405450622"/>
-      </p:ext>
-    </p:extLst>
-  </p:cSld>
-  <p:clrMapOvr>
-    <a:masterClrMapping/>
-  </p:clrMapOvr>
-</p:sld>
-</file>
-
-<file path=ppt/slides/slide8.xml><?xml version="1.0" encoding="utf-8"?>
-<p:sld xmlns:a="http://schemas.openxmlformats.org/drawingml/2006/main" xmlns:r="http://schemas.openxmlformats.org/officeDocument/2006/relationships" xmlns:p="http://schemas.openxmlformats.org/presentationml/2006/main" show="0">
-  <p:cSld>
-    <p:spTree>
-      <p:nvGrpSpPr>
-        <p:cNvPr id="1" name=""/>
-        <p:cNvGrpSpPr/>
-        <p:nvPr/>
-      </p:nvGrpSpPr>
-      <p:grpSpPr>
-        <a:xfrm>
-          <a:off x="0" y="0"/>
-          <a:ext cx="0" cy="0"/>
-          <a:chOff x="0" y="0"/>
-          <a:chExt cx="0" cy="0"/>
-        </a:xfrm>
-      </p:grpSpPr>
-      <p:sp>
-        <p:nvSpPr>
-          <p:cNvPr id="9" name="Inhaltsplatzhalter 8"/>
-          <p:cNvSpPr>
-            <a:spLocks noGrp="1"/>
-          </p:cNvSpPr>
-          <p:nvPr>
-            <p:ph idx="1"/>
-          </p:nvPr>
-        </p:nvSpPr>
-        <p:spPr/>
-        <p:txBody>
-          <a:bodyPr/>
-          <a:lstStyle/>
-          <a:p>
-            <a:endParaRPr lang="en-US" dirty="0"/>
-          </a:p>
-        </p:txBody>
-      </p:sp>
-      <p:sp>
-        <p:nvSpPr>
-          <p:cNvPr id="10" name="Textplatzhalter 9"/>
-          <p:cNvSpPr>
-            <a:spLocks noGrp="1"/>
-          </p:cNvSpPr>
-          <p:nvPr>
-            <p:ph type="body" sz="quarter" idx="13"/>
-          </p:nvPr>
-        </p:nvSpPr>
-        <p:spPr/>
-        <p:txBody>
-          <a:bodyPr/>
-          <a:lstStyle/>
-          <a:p>
-            <a:endParaRPr lang="en-US" dirty="0"/>
-          </a:p>
-        </p:txBody>
-      </p:sp>
-      <p:sp>
-        <p:nvSpPr>
-          <p:cNvPr id="8" name="Titel 7"/>
-          <p:cNvSpPr>
-            <a:spLocks noGrp="1"/>
-          </p:cNvSpPr>
-          <p:nvPr>
-            <p:ph type="title"/>
-          </p:nvPr>
-        </p:nvSpPr>
-        <p:spPr/>
-        <p:txBody>
-          <a:bodyPr/>
-          <a:lstStyle/>
-          <a:p>
-            <a:endParaRPr lang="en-US" dirty="0"/>
-          </a:p>
-        </p:txBody>
-      </p:sp>
-      <p:sp>
-        <p:nvSpPr>
-          <p:cNvPr id="11" name="Bildplatzhalter 10"/>
-          <p:cNvSpPr>
-            <a:spLocks noGrp="1"/>
-          </p:cNvSpPr>
-          <p:nvPr>
-            <p:ph type="pic" sz="quarter" idx="14"/>
-          </p:nvPr>
-        </p:nvSpPr>
-        <p:spPr/>
-      </p:sp>
-      <p:sp>
-        <p:nvSpPr>
-          <p:cNvPr id="12" name="Bildplatzhalter 11"/>
-          <p:cNvSpPr>
-            <a:spLocks noGrp="1"/>
-          </p:cNvSpPr>
-          <p:nvPr>
-            <p:ph type="pic" sz="quarter" idx="15"/>
-          </p:nvPr>
-        </p:nvSpPr>
-        <p:spPr/>
-      </p:sp>
-    </p:spTree>
-    <p:extLst>
-      <p:ext uri="{BB962C8B-B14F-4D97-AF65-F5344CB8AC3E}">
-        <p14:creationId xmlns:p14="http://schemas.microsoft.com/office/powerpoint/2010/main" val="1577483234"/>
-      </p:ext>
-    </p:extLst>
-  </p:cSld>
-  <p:clrMapOvr>
-    <a:masterClrMapping/>
-  </p:clrMapOvr>
-</p:sld>
-</file>
-
-<file path=ppt/slides/slide9.xml><?xml version="1.0" encoding="utf-8"?>
-<p:sld xmlns:a="http://schemas.openxmlformats.org/drawingml/2006/main" xmlns:r="http://schemas.openxmlformats.org/officeDocument/2006/relationships" xmlns:p="http://schemas.openxmlformats.org/presentationml/2006/main" show="0">
-  <p:cSld>
-    <p:spTree>
-      <p:nvGrpSpPr>
-        <p:cNvPr id="1" name=""/>
-        <p:cNvGrpSpPr/>
-        <p:nvPr/>
-      </p:nvGrpSpPr>
-      <p:grpSpPr>
-        <a:xfrm>
-          <a:off x="0" y="0"/>
-          <a:ext cx="0" cy="0"/>
-          <a:chOff x="0" y="0"/>
-          <a:chExt cx="0" cy="0"/>
-        </a:xfrm>
-      </p:grpSpPr>
-      <p:sp>
-        <p:nvSpPr>
-          <p:cNvPr id="10" name="Inhaltsplatzhalter 9"/>
-          <p:cNvSpPr>
-            <a:spLocks noGrp="1"/>
-          </p:cNvSpPr>
-          <p:nvPr>
-            <p:ph idx="1"/>
-          </p:nvPr>
-        </p:nvSpPr>
-        <p:spPr/>
-        <p:txBody>
-          <a:bodyPr/>
-          <a:lstStyle/>
-          <a:p>
-            <a:endParaRPr lang="en-US" dirty="0"/>
-          </a:p>
-        </p:txBody>
-      </p:sp>
-      <p:sp>
-        <p:nvSpPr>
-          <p:cNvPr id="11" name="Textplatzhalter 10"/>
-          <p:cNvSpPr>
-            <a:spLocks noGrp="1"/>
-          </p:cNvSpPr>
-          <p:nvPr>
-            <p:ph type="body" sz="quarter" idx="13"/>
-          </p:nvPr>
-        </p:nvSpPr>
-        <p:spPr/>
-        <p:txBody>
-          <a:bodyPr/>
-          <a:lstStyle/>
-          <a:p>
-            <a:endParaRPr lang="en-US" dirty="0"/>
-          </a:p>
-        </p:txBody>
-      </p:sp>
-      <p:sp>
-        <p:nvSpPr>
-          <p:cNvPr id="9" name="Titel 8"/>
-          <p:cNvSpPr>
-            <a:spLocks noGrp="1"/>
-          </p:cNvSpPr>
-          <p:nvPr>
-            <p:ph type="title"/>
-          </p:nvPr>
-        </p:nvSpPr>
-        <p:spPr/>
-        <p:txBody>
-          <a:bodyPr/>
-          <a:lstStyle/>
-          <a:p>
-            <a:endParaRPr lang="en-US" dirty="0"/>
-          </a:p>
-        </p:txBody>
-      </p:sp>
-      <p:sp>
-        <p:nvSpPr>
-          <p:cNvPr id="12" name="Bildplatzhalter 11"/>
-          <p:cNvSpPr>
-            <a:spLocks noGrp="1"/>
-          </p:cNvSpPr>
-          <p:nvPr>
-            <p:ph type="pic" sz="quarter" idx="14"/>
-          </p:nvPr>
-        </p:nvSpPr>
-        <p:spPr/>
-      </p:sp>
-      <p:sp>
-        <p:nvSpPr>
-          <p:cNvPr id="13" name="Bildplatzhalter 12"/>
-          <p:cNvSpPr>
-            <a:spLocks noGrp="1"/>
-          </p:cNvSpPr>
-          <p:nvPr>
-            <p:ph type="pic" sz="quarter" idx="15"/>
-          </p:nvPr>
-        </p:nvSpPr>
-        <p:spPr/>
-      </p:sp>
-    </p:spTree>
-    <p:extLst>
-      <p:ext uri="{BB962C8B-B14F-4D97-AF65-F5344CB8AC3E}">
-        <p14:creationId xmlns:p14="http://schemas.microsoft.com/office/powerpoint/2010/main" val="557626324"/>
+        <p14:creationId xmlns:p14="http://schemas.microsoft.com/office/powerpoint/2010/main" val="2440802619"/>
       </p:ext>
     </p:extLst>
   </p:cSld>

</xml_diff>